<commit_message>
Change text alignment to right on closing slide in presentation template
</commit_message>
<xml_diff>
--- a/Copy of SFApps.info Best Apps Presentation Template.pptx
+++ b/Copy of SFApps.info Best Apps Presentation Template.pptx
@@ -270,7 +270,7 @@
   </p:defaultTextStyle>
   <p:extLst>
     <p:ext uri="GoogleSlidesCustomDataVersion2">
-      <go:slidesCustomData xmlns:go="http://customooxmlschemas.google.com/" r:id="rId26" roundtripDataSignature="AMtx7mgP56zr0xQrB6GBB8YeIq5SlrtRgw=="/>
+      <go:slidesCustomData xmlns:go="http://customooxmlschemas.google.com/" r:id="rId26" roundtripDataSignature="AMtx7mg+z4VHcvh4WbTWIS1VAiwCC42+Sw=="/>
     </p:ext>
   </p:extLst>
 </p:presentation>
@@ -340,7 +340,7 @@
     </p:extLst>
   </p:cm>
   <p:cm authorId="0" idx="5" dt="2025-09-09T07:45:07.668">
-    <p:pos x="744" y="4039"/>
+    <p:pos x="624" y="4024"/>
     <p:text>developer from appexchange listing, sample:
 listing: https://appexchange.salesforce.com/appxListingDetail?listingId=95782e8c-19c5-4d7c-ae0a-3524594e46d4 developer: By Salesforce Labs</p:text>
     <p:extLst>
@@ -358,7 +358,7 @@
 <file path=ppt/comments/comment3.xml><?xml version="1.0" encoding="utf-8"?>
 <p:cmLst xmlns:a="http://schemas.openxmlformats.org/drawingml/2006/main" xmlns:r="http://schemas.openxmlformats.org/officeDocument/2006/relationships" xmlns:mc="http://schemas.openxmlformats.org/markup-compatibility/2006" xmlns:mv="urn:schemas-microsoft-com:mac:vml" xmlns:p="http://schemas.openxmlformats.org/presentationml/2006/main" xmlns:c="http://schemas.openxmlformats.org/drawingml/2006/chart" xmlns:dgm="http://schemas.openxmlformats.org/drawingml/2006/diagram" xmlns:o="urn:schemas-microsoft-com:office:office" xmlns:v="urn:schemas-microsoft-com:vml" xmlns:pvml="urn:schemas-microsoft-com:office:powerpoint" xmlns:com="http://schemas.openxmlformats.org/drawingml/2006/compatibility" xmlns:p14="http://schemas.microsoft.com/office/powerpoint/2010/main" xmlns:p15="http://schemas.microsoft.com/office/powerpoint/2012/main" xmlns:ahyp="http://schemas.microsoft.com/office/drawing/2018/hyperlinkcolor">
   <p:cm authorId="0" idx="6" dt="2025-09-09T07:42:25.509">
-    <p:pos x="1817" y="4693"/>
+    <p:pos x="1706" y="4698"/>
     <p:text>name of category or industry (same as on the cover slide)</p:text>
     <p:extLst>
       <p:ext uri="{C676402C-5697-4E1C-873F-D02D1690AC5C}">
@@ -370,7 +370,7 @@
     </p:extLst>
   </p:cm>
   <p:cm authorId="0" idx="7" dt="2025-09-09T07:47:44.451">
-    <p:pos x="1817" y="4793"/>
+    <p:pos x="1706" y="4798"/>
     <p:text>link on the button is according to the provided in the interface</p:text>
     <p:extLst>
       <p:ext uri="{C676402C-5697-4E1C-873F-D02D1690AC5C}">
@@ -1982,7 +1982,7 @@
   <p:cSld>
     <p:spTree>
       <p:nvGrpSpPr>
-        <p:cNvPr id="175" name="Shape 175"/>
+        <p:cNvPr id="167" name="Shape 167"/>
         <p:cNvGrpSpPr/>
         <p:nvPr/>
       </p:nvGrpSpPr>
@@ -1996,7 +1996,7 @@
       </p:grpSpPr>
       <p:sp>
         <p:nvSpPr>
-          <p:cNvPr id="176" name="Google Shape;176;p10:notes"/>
+          <p:cNvPr id="168" name="Google Shape;168;p10:notes"/>
           <p:cNvSpPr/>
           <p:nvPr>
             <p:ph idx="2" type="sldImg"/>
@@ -2041,7 +2041,7 @@
       </p:sp>
       <p:sp>
         <p:nvSpPr>
-          <p:cNvPr id="177" name="Google Shape;177;p10:notes"/>
+          <p:cNvPr id="169" name="Google Shape;169;p10:notes"/>
           <p:cNvSpPr txBox="1"/>
           <p:nvPr>
             <p:ph idx="1" type="body"/>
@@ -2088,7 +2088,7 @@
       </p:sp>
       <p:sp>
         <p:nvSpPr>
-          <p:cNvPr id="178" name="Google Shape;178;p10:notes"/>
+          <p:cNvPr id="170" name="Google Shape;170;p10:notes"/>
           <p:cNvSpPr txBox="1"/>
           <p:nvPr>
             <p:ph idx="12" type="sldNum"/>
@@ -2147,7 +2147,7 @@
   <p:cSld>
     <p:spTree>
       <p:nvGrpSpPr>
-        <p:cNvPr id="192" name="Shape 192"/>
+        <p:cNvPr id="183" name="Shape 183"/>
         <p:cNvGrpSpPr/>
         <p:nvPr/>
       </p:nvGrpSpPr>
@@ -2161,7 +2161,7 @@
       </p:grpSpPr>
       <p:sp>
         <p:nvSpPr>
-          <p:cNvPr id="193" name="Google Shape;193;p11:notes"/>
+          <p:cNvPr id="184" name="Google Shape;184;p11:notes"/>
           <p:cNvSpPr/>
           <p:nvPr>
             <p:ph idx="2" type="sldImg"/>
@@ -2206,7 +2206,7 @@
       </p:sp>
       <p:sp>
         <p:nvSpPr>
-          <p:cNvPr id="194" name="Google Shape;194;p11:notes"/>
+          <p:cNvPr id="185" name="Google Shape;185;p11:notes"/>
           <p:cNvSpPr txBox="1"/>
           <p:nvPr>
             <p:ph idx="1" type="body"/>
@@ -2253,7 +2253,7 @@
       </p:sp>
       <p:sp>
         <p:nvSpPr>
-          <p:cNvPr id="195" name="Google Shape;195;p11:notes"/>
+          <p:cNvPr id="186" name="Google Shape;186;p11:notes"/>
           <p:cNvSpPr txBox="1"/>
           <p:nvPr>
             <p:ph idx="12" type="sldNum"/>
@@ -2312,7 +2312,7 @@
   <p:cSld>
     <p:spTree>
       <p:nvGrpSpPr>
-        <p:cNvPr id="211" name="Shape 211"/>
+        <p:cNvPr id="201" name="Shape 201"/>
         <p:cNvGrpSpPr/>
         <p:nvPr/>
       </p:nvGrpSpPr>
@@ -2326,7 +2326,7 @@
       </p:grpSpPr>
       <p:sp>
         <p:nvSpPr>
-          <p:cNvPr id="212" name="Google Shape;212;p12:notes"/>
+          <p:cNvPr id="202" name="Google Shape;202;p12:notes"/>
           <p:cNvSpPr/>
           <p:nvPr>
             <p:ph idx="2" type="sldImg"/>
@@ -2371,7 +2371,7 @@
       </p:sp>
       <p:sp>
         <p:nvSpPr>
-          <p:cNvPr id="213" name="Google Shape;213;p12:notes"/>
+          <p:cNvPr id="203" name="Google Shape;203;p12:notes"/>
           <p:cNvSpPr txBox="1"/>
           <p:nvPr>
             <p:ph idx="1" type="body"/>
@@ -2418,7 +2418,7 @@
       </p:sp>
       <p:sp>
         <p:nvSpPr>
-          <p:cNvPr id="214" name="Google Shape;214;p12:notes"/>
+          <p:cNvPr id="204" name="Google Shape;204;p12:notes"/>
           <p:cNvSpPr txBox="1"/>
           <p:nvPr>
             <p:ph idx="12" type="sldNum"/>
@@ -2642,7 +2642,7 @@
   <p:cSld>
     <p:spTree>
       <p:nvGrpSpPr>
-        <p:cNvPr id="46" name="Shape 46"/>
+        <p:cNvPr id="45" name="Shape 45"/>
         <p:cNvGrpSpPr/>
         <p:nvPr/>
       </p:nvGrpSpPr>
@@ -2656,7 +2656,7 @@
       </p:grpSpPr>
       <p:sp>
         <p:nvSpPr>
-          <p:cNvPr id="47" name="Google Shape;47;p3:notes"/>
+          <p:cNvPr id="46" name="Google Shape;46;p3:notes"/>
           <p:cNvSpPr/>
           <p:nvPr>
             <p:ph idx="2" type="sldImg"/>
@@ -2701,7 +2701,7 @@
       </p:sp>
       <p:sp>
         <p:nvSpPr>
-          <p:cNvPr id="48" name="Google Shape;48;p3:notes"/>
+          <p:cNvPr id="47" name="Google Shape;47;p3:notes"/>
           <p:cNvSpPr txBox="1"/>
           <p:nvPr>
             <p:ph idx="1" type="body"/>
@@ -2748,7 +2748,7 @@
       </p:sp>
       <p:sp>
         <p:nvSpPr>
-          <p:cNvPr id="49" name="Google Shape;49;p3:notes"/>
+          <p:cNvPr id="48" name="Google Shape;48;p3:notes"/>
           <p:cNvSpPr txBox="1"/>
           <p:nvPr>
             <p:ph idx="12" type="sldNum"/>
@@ -2807,7 +2807,7 @@
   <p:cSld>
     <p:spTree>
       <p:nvGrpSpPr>
-        <p:cNvPr id="62" name="Shape 62"/>
+        <p:cNvPr id="60" name="Shape 60"/>
         <p:cNvGrpSpPr/>
         <p:nvPr/>
       </p:nvGrpSpPr>
@@ -2821,7 +2821,7 @@
       </p:grpSpPr>
       <p:sp>
         <p:nvSpPr>
-          <p:cNvPr id="63" name="Google Shape;63;p4:notes"/>
+          <p:cNvPr id="61" name="Google Shape;61;p4:notes"/>
           <p:cNvSpPr/>
           <p:nvPr>
             <p:ph idx="2" type="sldImg"/>
@@ -2866,7 +2866,7 @@
       </p:sp>
       <p:sp>
         <p:nvSpPr>
-          <p:cNvPr id="64" name="Google Shape;64;p4:notes"/>
+          <p:cNvPr id="62" name="Google Shape;62;p4:notes"/>
           <p:cNvSpPr txBox="1"/>
           <p:nvPr>
             <p:ph idx="1" type="body"/>
@@ -2913,7 +2913,7 @@
       </p:sp>
       <p:sp>
         <p:nvSpPr>
-          <p:cNvPr id="65" name="Google Shape;65;p4:notes"/>
+          <p:cNvPr id="63" name="Google Shape;63;p4:notes"/>
           <p:cNvSpPr txBox="1"/>
           <p:nvPr>
             <p:ph idx="12" type="sldNum"/>
@@ -2972,7 +2972,7 @@
   <p:cSld>
     <p:spTree>
       <p:nvGrpSpPr>
-        <p:cNvPr id="78" name="Shape 78"/>
+        <p:cNvPr id="75" name="Shape 75"/>
         <p:cNvGrpSpPr/>
         <p:nvPr/>
       </p:nvGrpSpPr>
@@ -2986,7 +2986,7 @@
       </p:grpSpPr>
       <p:sp>
         <p:nvSpPr>
-          <p:cNvPr id="79" name="Google Shape;79;p5:notes"/>
+          <p:cNvPr id="76" name="Google Shape;76;p5:notes"/>
           <p:cNvSpPr/>
           <p:nvPr>
             <p:ph idx="2" type="sldImg"/>
@@ -3031,7 +3031,7 @@
       </p:sp>
       <p:sp>
         <p:nvSpPr>
-          <p:cNvPr id="80" name="Google Shape;80;p5:notes"/>
+          <p:cNvPr id="77" name="Google Shape;77;p5:notes"/>
           <p:cNvSpPr txBox="1"/>
           <p:nvPr>
             <p:ph idx="1" type="body"/>
@@ -3078,7 +3078,7 @@
       </p:sp>
       <p:sp>
         <p:nvSpPr>
-          <p:cNvPr id="81" name="Google Shape;81;p5:notes"/>
+          <p:cNvPr id="78" name="Google Shape;78;p5:notes"/>
           <p:cNvSpPr txBox="1"/>
           <p:nvPr>
             <p:ph idx="12" type="sldNum"/>
@@ -3137,7 +3137,7 @@
   <p:cSld>
     <p:spTree>
       <p:nvGrpSpPr>
-        <p:cNvPr id="97" name="Shape 97"/>
+        <p:cNvPr id="93" name="Shape 93"/>
         <p:cNvGrpSpPr/>
         <p:nvPr/>
       </p:nvGrpSpPr>
@@ -3151,7 +3151,7 @@
       </p:grpSpPr>
       <p:sp>
         <p:nvSpPr>
-          <p:cNvPr id="98" name="Google Shape;98;p6:notes"/>
+          <p:cNvPr id="94" name="Google Shape;94;p6:notes"/>
           <p:cNvSpPr/>
           <p:nvPr>
             <p:ph idx="2" type="sldImg"/>
@@ -3196,7 +3196,7 @@
       </p:sp>
       <p:sp>
         <p:nvSpPr>
-          <p:cNvPr id="99" name="Google Shape;99;p6:notes"/>
+          <p:cNvPr id="95" name="Google Shape;95;p6:notes"/>
           <p:cNvSpPr txBox="1"/>
           <p:nvPr>
             <p:ph idx="1" type="body"/>
@@ -3243,7 +3243,7 @@
       </p:sp>
       <p:sp>
         <p:nvSpPr>
-          <p:cNvPr id="100" name="Google Shape;100;p6:notes"/>
+          <p:cNvPr id="96" name="Google Shape;96;p6:notes"/>
           <p:cNvSpPr txBox="1"/>
           <p:nvPr>
             <p:ph idx="12" type="sldNum"/>
@@ -3302,7 +3302,7 @@
   <p:cSld>
     <p:spTree>
       <p:nvGrpSpPr>
-        <p:cNvPr id="113" name="Shape 113"/>
+        <p:cNvPr id="108" name="Shape 108"/>
         <p:cNvGrpSpPr/>
         <p:nvPr/>
       </p:nvGrpSpPr>
@@ -3316,7 +3316,7 @@
       </p:grpSpPr>
       <p:sp>
         <p:nvSpPr>
-          <p:cNvPr id="114" name="Google Shape;114;p7:notes"/>
+          <p:cNvPr id="109" name="Google Shape;109;p7:notes"/>
           <p:cNvSpPr/>
           <p:nvPr>
             <p:ph idx="2" type="sldImg"/>
@@ -3361,7 +3361,7 @@
       </p:sp>
       <p:sp>
         <p:nvSpPr>
-          <p:cNvPr id="115" name="Google Shape;115;p7:notes"/>
+          <p:cNvPr id="110" name="Google Shape;110;p7:notes"/>
           <p:cNvSpPr txBox="1"/>
           <p:nvPr>
             <p:ph idx="1" type="body"/>
@@ -3408,7 +3408,7 @@
       </p:sp>
       <p:sp>
         <p:nvSpPr>
-          <p:cNvPr id="116" name="Google Shape;116;p7:notes"/>
+          <p:cNvPr id="111" name="Google Shape;111;p7:notes"/>
           <p:cNvSpPr txBox="1"/>
           <p:nvPr>
             <p:ph idx="12" type="sldNum"/>
@@ -3467,7 +3467,7 @@
   <p:cSld>
     <p:spTree>
       <p:nvGrpSpPr>
-        <p:cNvPr id="133" name="Shape 133"/>
+        <p:cNvPr id="127" name="Shape 127"/>
         <p:cNvGrpSpPr/>
         <p:nvPr/>
       </p:nvGrpSpPr>
@@ -3481,7 +3481,7 @@
       </p:grpSpPr>
       <p:sp>
         <p:nvSpPr>
-          <p:cNvPr id="134" name="Google Shape;134;p8:notes"/>
+          <p:cNvPr id="128" name="Google Shape;128;p8:notes"/>
           <p:cNvSpPr/>
           <p:nvPr>
             <p:ph idx="2" type="sldImg"/>
@@ -3526,7 +3526,7 @@
       </p:sp>
       <p:sp>
         <p:nvSpPr>
-          <p:cNvPr id="135" name="Google Shape;135;p8:notes"/>
+          <p:cNvPr id="129" name="Google Shape;129;p8:notes"/>
           <p:cNvSpPr txBox="1"/>
           <p:nvPr>
             <p:ph idx="1" type="body"/>
@@ -3573,7 +3573,7 @@
       </p:sp>
       <p:sp>
         <p:nvSpPr>
-          <p:cNvPr id="136" name="Google Shape;136;p8:notes"/>
+          <p:cNvPr id="130" name="Google Shape;130;p8:notes"/>
           <p:cNvSpPr txBox="1"/>
           <p:nvPr>
             <p:ph idx="12" type="sldNum"/>
@@ -3632,7 +3632,7 @@
   <p:cSld>
     <p:spTree>
       <p:nvGrpSpPr>
-        <p:cNvPr id="152" name="Shape 152"/>
+        <p:cNvPr id="145" name="Shape 145"/>
         <p:cNvGrpSpPr/>
         <p:nvPr/>
       </p:nvGrpSpPr>
@@ -3646,7 +3646,7 @@
       </p:grpSpPr>
       <p:sp>
         <p:nvSpPr>
-          <p:cNvPr id="153" name="Google Shape;153;p9:notes"/>
+          <p:cNvPr id="146" name="Google Shape;146;p9:notes"/>
           <p:cNvSpPr/>
           <p:nvPr>
             <p:ph idx="2" type="sldImg"/>
@@ -3691,7 +3691,7 @@
       </p:sp>
       <p:sp>
         <p:nvSpPr>
-          <p:cNvPr id="154" name="Google Shape;154;p9:notes"/>
+          <p:cNvPr id="147" name="Google Shape;147;p9:notes"/>
           <p:cNvSpPr txBox="1"/>
           <p:nvPr>
             <p:ph idx="1" type="body"/>
@@ -3738,7 +3738,7 @@
       </p:sp>
       <p:sp>
         <p:nvSpPr>
-          <p:cNvPr id="155" name="Google Shape;155;p9:notes"/>
+          <p:cNvPr id="148" name="Google Shape;148;p9:notes"/>
           <p:cNvSpPr txBox="1"/>
           <p:nvPr>
             <p:ph idx="12" type="sldNum"/>
@@ -5083,7 +5083,7 @@
     </p:bg>
     <p:spTree>
       <p:nvGrpSpPr>
-        <p:cNvPr id="179" name="Shape 179"/>
+        <p:cNvPr id="171" name="Shape 171"/>
         <p:cNvGrpSpPr/>
         <p:nvPr/>
       </p:nvGrpSpPr>
@@ -5097,7 +5097,7 @@
       </p:grpSpPr>
       <p:pic>
         <p:nvPicPr>
-          <p:cNvPr descr="preencoded.png" id="180" name="Google Shape;180;p10"/>
+          <p:cNvPr descr="preencoded.png" id="172" name="Google Shape;172;p10"/>
           <p:cNvPicPr preferRelativeResize="0"/>
           <p:nvPr/>
         </p:nvPicPr>
@@ -5124,7 +5124,7 @@
       </p:pic>
       <p:pic>
         <p:nvPicPr>
-          <p:cNvPr descr="preencoded.png" id="181" name="Google Shape;181;p10">
+          <p:cNvPr descr="preencoded.png" id="173" name="Google Shape;173;p10">
             <a:hlinkClick r:id="rId4"/>
           </p:cNvPr>
           <p:cNvPicPr preferRelativeResize="0"/>
@@ -5153,7 +5153,7 @@
       </p:pic>
       <p:pic>
         <p:nvPicPr>
-          <p:cNvPr descr="preencoded.png" id="182" name="Google Shape;182;p10"/>
+          <p:cNvPr descr="preencoded.png" id="174" name="Google Shape;174;p10"/>
           <p:cNvPicPr preferRelativeResize="0"/>
           <p:nvPr/>
         </p:nvPicPr>
@@ -5180,7 +5180,7 @@
       </p:pic>
       <p:pic>
         <p:nvPicPr>
-          <p:cNvPr descr="preencoded.png" id="183" name="Google Shape;183;p10"/>
+          <p:cNvPr descr="preencoded.png" id="175" name="Google Shape;175;p10"/>
           <p:cNvPicPr preferRelativeResize="0"/>
           <p:nvPr/>
         </p:nvPicPr>
@@ -5193,8 +5193,8 @@
         </p:blipFill>
         <p:spPr>
           <a:xfrm>
-            <a:off x="1086947" y="6288159"/>
-            <a:ext cx="3876921" cy="706203"/>
+            <a:off x="990783" y="1050298"/>
+            <a:ext cx="1343494" cy="1343494"/>
           </a:xfrm>
           <a:prstGeom prst="rect">
             <a:avLst/>
@@ -5207,7 +5207,7 @@
       </p:pic>
       <p:pic>
         <p:nvPicPr>
-          <p:cNvPr descr="preencoded.png" id="184" name="Google Shape;184;p10"/>
+          <p:cNvPr descr="preencoded.png" id="176" name="Google Shape;176;p10"/>
           <p:cNvPicPr preferRelativeResize="0"/>
           <p:nvPr/>
         </p:nvPicPr>
@@ -5220,8 +5220,8 @@
         </p:blipFill>
         <p:spPr>
           <a:xfrm>
-            <a:off x="990783" y="1050298"/>
-            <a:ext cx="1343494" cy="1343494"/>
+            <a:off x="5411522" y="7574902"/>
+            <a:ext cx="1838545" cy="629292"/>
           </a:xfrm>
           <a:prstGeom prst="rect">
             <a:avLst/>
@@ -5234,7 +5234,7 @@
       </p:pic>
       <p:pic>
         <p:nvPicPr>
-          <p:cNvPr descr="preencoded.png" id="185" name="Google Shape;185;p10"/>
+          <p:cNvPr descr="preencoded.png" id="177" name="Google Shape;177;p10"/>
           <p:cNvPicPr preferRelativeResize="0"/>
           <p:nvPr/>
         </p:nvPicPr>
@@ -5247,8 +5247,8 @@
         </p:blipFill>
         <p:spPr>
           <a:xfrm>
-            <a:off x="5411522" y="7574902"/>
-            <a:ext cx="1838545" cy="629292"/>
+            <a:off x="3763896" y="915941"/>
+            <a:ext cx="2848314" cy="972544"/>
           </a:xfrm>
           <a:prstGeom prst="rect">
             <a:avLst/>
@@ -5261,7 +5261,7 @@
       </p:pic>
       <p:pic>
         <p:nvPicPr>
-          <p:cNvPr descr="preencoded.png" id="186" name="Google Shape;186;p10"/>
+          <p:cNvPr descr="preencoded.png" id="178" name="Google Shape;178;p10"/>
           <p:cNvPicPr preferRelativeResize="0"/>
           <p:nvPr/>
         </p:nvPicPr>
@@ -5274,8 +5274,8 @@
         </p:blipFill>
         <p:spPr>
           <a:xfrm>
-            <a:off x="3763896" y="915941"/>
-            <a:ext cx="2848314" cy="972544"/>
+            <a:off x="9039680" y="2607778"/>
+            <a:ext cx="9250116" cy="7071239"/>
           </a:xfrm>
           <a:prstGeom prst="rect">
             <a:avLst/>
@@ -5288,7 +5288,7 @@
       </p:pic>
       <p:pic>
         <p:nvPicPr>
-          <p:cNvPr descr="preencoded.png" id="187" name="Google Shape;187;p10"/>
+          <p:cNvPr descr="preencoded.png" id="179" name="Google Shape;179;p10"/>
           <p:cNvPicPr preferRelativeResize="0"/>
           <p:nvPr/>
         </p:nvPicPr>
@@ -5301,33 +5301,6 @@
         </p:blipFill>
         <p:spPr>
           <a:xfrm>
-            <a:off x="9039680" y="2607778"/>
-            <a:ext cx="9250116" cy="7071239"/>
-          </a:xfrm>
-          <a:prstGeom prst="rect">
-            <a:avLst/>
-          </a:prstGeom>
-          <a:noFill/>
-          <a:ln>
-            <a:noFill/>
-          </a:ln>
-        </p:spPr>
-      </p:pic>
-      <p:pic>
-        <p:nvPicPr>
-          <p:cNvPr descr="preencoded.png" id="188" name="Google Shape;188;p10"/>
-          <p:cNvPicPr preferRelativeResize="0"/>
-          <p:nvPr/>
-        </p:nvPicPr>
-        <p:blipFill rotWithShape="1">
-          <a:blip r:embed="rId12">
-            <a:alphaModFix/>
-          </a:blip>
-          <a:srcRect b="0" l="0" r="0" t="0"/>
-          <a:stretch/>
-        </p:blipFill>
-        <p:spPr>
-          <a:xfrm>
             <a:off x="8168232" y="881791"/>
             <a:ext cx="4097180" cy="4097180"/>
           </a:xfrm>
@@ -5342,7 +5315,7 @@
       </p:pic>
       <p:sp>
         <p:nvSpPr>
-          <p:cNvPr id="189" name="Google Shape;189;p10"/>
+          <p:cNvPr id="180" name="Google Shape;180;p10"/>
           <p:cNvSpPr/>
           <p:nvPr/>
         </p:nvSpPr>
@@ -5360,7 +5333,7 @@
           </a:ln>
         </p:spPr>
         <p:txBody>
-          <a:bodyPr anchorCtr="0" anchor="t" bIns="0" lIns="0" spcFirstLastPara="1" rIns="0" wrap="square" tIns="0">
+          <a:bodyPr anchorCtr="0" anchor="b" bIns="0" lIns="0" spcFirstLastPara="1" rIns="0" wrap="square" tIns="0">
             <a:noAutofit/>
           </a:bodyPr>
           <a:lstStyle/>
@@ -5408,14 +5381,14 @@
       </p:sp>
       <p:sp>
         <p:nvSpPr>
-          <p:cNvPr id="190" name="Google Shape;190;p10"/>
+          <p:cNvPr id="181" name="Google Shape;181;p10"/>
           <p:cNvSpPr/>
           <p:nvPr/>
         </p:nvSpPr>
         <p:spPr>
-          <a:xfrm rot="-600">
-            <a:off x="1401287" y="6374606"/>
-            <a:ext cx="3362418" cy="533969"/>
+          <a:xfrm rot="-613">
+            <a:off x="1143190" y="6374599"/>
+            <a:ext cx="3362400" cy="534000"/>
           </a:xfrm>
           <a:prstGeom prst="rect">
             <a:avLst/>
@@ -5474,7 +5447,7 @@
       </p:sp>
       <p:sp>
         <p:nvSpPr>
-          <p:cNvPr id="191" name="Google Shape;191;p10"/>
+          <p:cNvPr id="182" name="Google Shape;182;p10"/>
           <p:cNvSpPr/>
           <p:nvPr/>
         </p:nvSpPr>
@@ -5558,7 +5531,7 @@
     </p:bg>
     <p:spTree>
       <p:nvGrpSpPr>
-        <p:cNvPr id="196" name="Shape 196"/>
+        <p:cNvPr id="187" name="Shape 187"/>
         <p:cNvGrpSpPr/>
         <p:nvPr/>
       </p:nvGrpSpPr>
@@ -5572,7 +5545,7 @@
       </p:grpSpPr>
       <p:pic>
         <p:nvPicPr>
-          <p:cNvPr descr="preencoded.png" id="197" name="Google Shape;197;p11"/>
+          <p:cNvPr descr="preencoded.png" id="188" name="Google Shape;188;p11"/>
           <p:cNvPicPr preferRelativeResize="0"/>
           <p:nvPr/>
         </p:nvPicPr>
@@ -5599,7 +5572,7 @@
       </p:pic>
       <p:pic>
         <p:nvPicPr>
-          <p:cNvPr descr="preencoded.png" id="198" name="Google Shape;198;p11"/>
+          <p:cNvPr descr="preencoded.png" id="189" name="Google Shape;189;p11"/>
           <p:cNvPicPr preferRelativeResize="0"/>
           <p:nvPr/>
         </p:nvPicPr>
@@ -5626,7 +5599,7 @@
       </p:pic>
       <p:pic>
         <p:nvPicPr>
-          <p:cNvPr descr="preencoded.png" id="199" name="Google Shape;199;p11"/>
+          <p:cNvPr descr="preencoded.png" id="190" name="Google Shape;190;p11"/>
           <p:cNvPicPr preferRelativeResize="0"/>
           <p:nvPr/>
         </p:nvPicPr>
@@ -5653,7 +5626,7 @@
       </p:pic>
       <p:pic>
         <p:nvPicPr>
-          <p:cNvPr descr="preencoded.png" id="200" name="Google Shape;200;p11"/>
+          <p:cNvPr descr="preencoded.png" id="191" name="Google Shape;191;p11"/>
           <p:cNvPicPr preferRelativeResize="0"/>
           <p:nvPr/>
         </p:nvPicPr>
@@ -5680,7 +5653,7 @@
       </p:pic>
       <p:pic>
         <p:nvPicPr>
-          <p:cNvPr descr="preencoded.png" id="201" name="Google Shape;201;p11"/>
+          <p:cNvPr descr="preencoded.png" id="192" name="Google Shape;192;p11"/>
           <p:cNvPicPr preferRelativeResize="0"/>
           <p:nvPr/>
         </p:nvPicPr>
@@ -5693,8 +5666,8 @@
         </p:blipFill>
         <p:spPr>
           <a:xfrm>
-            <a:off x="11040833" y="7782336"/>
-            <a:ext cx="2448171" cy="705704"/>
+            <a:off x="11039888" y="2362546"/>
+            <a:ext cx="2639170" cy="2134526"/>
           </a:xfrm>
           <a:prstGeom prst="rect">
             <a:avLst/>
@@ -5707,7 +5680,7 @@
       </p:pic>
       <p:pic>
         <p:nvPicPr>
-          <p:cNvPr descr="preencoded.png" id="202" name="Google Shape;202;p11"/>
+          <p:cNvPr descr="preencoded.png" id="193" name="Google Shape;193;p11"/>
           <p:cNvPicPr preferRelativeResize="0"/>
           <p:nvPr/>
         </p:nvPicPr>
@@ -5720,8 +5693,8 @@
         </p:blipFill>
         <p:spPr>
           <a:xfrm>
-            <a:off x="11039888" y="2362546"/>
-            <a:ext cx="2639170" cy="2134526"/>
+            <a:off x="638296" y="696876"/>
+            <a:ext cx="4391853" cy="2373258"/>
           </a:xfrm>
           <a:prstGeom prst="rect">
             <a:avLst/>
@@ -5734,7 +5707,7 @@
       </p:pic>
       <p:pic>
         <p:nvPicPr>
-          <p:cNvPr descr="preencoded.png" id="203" name="Google Shape;203;p11"/>
+          <p:cNvPr descr="preencoded.png" id="194" name="Google Shape;194;p11"/>
           <p:cNvPicPr preferRelativeResize="0"/>
           <p:nvPr/>
         </p:nvPicPr>
@@ -5747,8 +5720,8 @@
         </p:blipFill>
         <p:spPr>
           <a:xfrm>
-            <a:off x="638296" y="696876"/>
-            <a:ext cx="4391853" cy="2373258"/>
+            <a:off x="5505609" y="915668"/>
+            <a:ext cx="2762925" cy="1934539"/>
           </a:xfrm>
           <a:prstGeom prst="rect">
             <a:avLst/>
@@ -5761,7 +5734,7 @@
       </p:pic>
       <p:pic>
         <p:nvPicPr>
-          <p:cNvPr descr="preencoded.png" id="204" name="Google Shape;204;p11"/>
+          <p:cNvPr descr="preencoded.png" id="195" name="Google Shape;195;p11"/>
           <p:cNvPicPr preferRelativeResize="0"/>
           <p:nvPr/>
         </p:nvPicPr>
@@ -5774,8 +5747,8 @@
         </p:blipFill>
         <p:spPr>
           <a:xfrm>
-            <a:off x="5505609" y="915668"/>
-            <a:ext cx="2762925" cy="1934539"/>
+            <a:off x="124477" y="3740150"/>
+            <a:ext cx="7755162" cy="5193841"/>
           </a:xfrm>
           <a:prstGeom prst="rect">
             <a:avLst/>
@@ -5788,7 +5761,7 @@
       </p:pic>
       <p:pic>
         <p:nvPicPr>
-          <p:cNvPr descr="preencoded.png" id="205" name="Google Shape;205;p11"/>
+          <p:cNvPr descr="preencoded.png" id="196" name="Google Shape;196;p11"/>
           <p:cNvPicPr preferRelativeResize="0"/>
           <p:nvPr/>
         </p:nvPicPr>
@@ -5801,8 +5774,8 @@
         </p:blipFill>
         <p:spPr>
           <a:xfrm>
-            <a:off x="124477" y="3740150"/>
-            <a:ext cx="7755162" cy="5193841"/>
+            <a:off x="14440133" y="1333181"/>
+            <a:ext cx="2848314" cy="972544"/>
           </a:xfrm>
           <a:prstGeom prst="rect">
             <a:avLst/>
@@ -5815,12 +5788,14 @@
       </p:pic>
       <p:pic>
         <p:nvPicPr>
-          <p:cNvPr descr="preencoded.png" id="206" name="Google Shape;206;p11"/>
+          <p:cNvPr descr="preencoded.png" id="197" name="Google Shape;197;p11">
+            <a:hlinkClick r:id="rId12"/>
+          </p:cNvPr>
           <p:cNvPicPr preferRelativeResize="0"/>
           <p:nvPr/>
         </p:nvPicPr>
         <p:blipFill rotWithShape="1">
-          <a:blip r:embed="rId12">
+          <a:blip r:embed="rId13">
             <a:alphaModFix/>
           </a:blip>
           <a:srcRect b="0" l="0" r="0" t="0"/>
@@ -5828,35 +5803,6 @@
         </p:blipFill>
         <p:spPr>
           <a:xfrm>
-            <a:off x="14440133" y="1333181"/>
-            <a:ext cx="2848314" cy="972544"/>
-          </a:xfrm>
-          <a:prstGeom prst="rect">
-            <a:avLst/>
-          </a:prstGeom>
-          <a:noFill/>
-          <a:ln>
-            <a:noFill/>
-          </a:ln>
-        </p:spPr>
-      </p:pic>
-      <p:pic>
-        <p:nvPicPr>
-          <p:cNvPr descr="preencoded.png" id="207" name="Google Shape;207;p11">
-            <a:hlinkClick r:id="rId13"/>
-          </p:cNvPr>
-          <p:cNvPicPr preferRelativeResize="0"/>
-          <p:nvPr/>
-        </p:nvPicPr>
-        <p:blipFill rotWithShape="1">
-          <a:blip r:embed="rId14">
-            <a:alphaModFix/>
-          </a:blip>
-          <a:srcRect b="0" l="0" r="0" t="0"/>
-          <a:stretch/>
-        </p:blipFill>
-        <p:spPr>
-          <a:xfrm>
             <a:off x="13984298" y="9153063"/>
             <a:ext cx="3505456" cy="734649"/>
           </a:xfrm>
@@ -5871,7 +5817,7 @@
       </p:pic>
       <p:sp>
         <p:nvSpPr>
-          <p:cNvPr id="208" name="Google Shape;208;p11"/>
+          <p:cNvPr id="198" name="Google Shape;198;p11"/>
           <p:cNvSpPr/>
           <p:nvPr/>
         </p:nvSpPr>
@@ -5937,7 +5883,7 @@
       </p:sp>
       <p:sp>
         <p:nvSpPr>
-          <p:cNvPr id="209" name="Google Shape;209;p11"/>
+          <p:cNvPr id="199" name="Google Shape;199;p11"/>
           <p:cNvSpPr/>
           <p:nvPr/>
         </p:nvSpPr>
@@ -5955,7 +5901,7 @@
           </a:ln>
         </p:spPr>
         <p:txBody>
-          <a:bodyPr anchorCtr="0" anchor="t" bIns="0" lIns="0" spcFirstLastPara="1" rIns="0" wrap="square" tIns="0">
+          <a:bodyPr anchorCtr="0" anchor="b" bIns="0" lIns="0" spcFirstLastPara="1" rIns="0" wrap="square" tIns="0">
             <a:noAutofit/>
           </a:bodyPr>
           <a:lstStyle/>
@@ -6003,14 +5949,14 @@
       </p:sp>
       <p:sp>
         <p:nvSpPr>
-          <p:cNvPr id="210" name="Google Shape;210;p11"/>
+          <p:cNvPr id="200" name="Google Shape;200;p11"/>
           <p:cNvSpPr/>
           <p:nvPr/>
         </p:nvSpPr>
         <p:spPr>
-          <a:xfrm rot="-600">
-            <a:off x="11383748" y="7868542"/>
-            <a:ext cx="1828893" cy="533709"/>
+          <a:xfrm rot="-564">
+            <a:off x="11040076" y="7886427"/>
+            <a:ext cx="1828800" cy="533700"/>
           </a:xfrm>
           <a:prstGeom prst="rect">
             <a:avLst/>
@@ -6087,7 +6033,7 @@
     </p:bg>
     <p:spTree>
       <p:nvGrpSpPr>
-        <p:cNvPr id="215" name="Shape 215"/>
+        <p:cNvPr id="205" name="Shape 205"/>
         <p:cNvGrpSpPr/>
         <p:nvPr/>
       </p:nvGrpSpPr>
@@ -6101,7 +6047,7 @@
       </p:grpSpPr>
       <p:pic>
         <p:nvPicPr>
-          <p:cNvPr descr="preencoded.png" id="216" name="Google Shape;216;p12"/>
+          <p:cNvPr descr="preencoded.png" id="206" name="Google Shape;206;p12"/>
           <p:cNvPicPr preferRelativeResize="0"/>
           <p:nvPr/>
         </p:nvPicPr>
@@ -6128,7 +6074,7 @@
       </p:pic>
       <p:pic>
         <p:nvPicPr>
-          <p:cNvPr descr="preencoded.png" id="217" name="Google Shape;217;p12"/>
+          <p:cNvPr descr="preencoded.png" id="207" name="Google Shape;207;p12"/>
           <p:cNvPicPr preferRelativeResize="0"/>
           <p:nvPr/>
         </p:nvPicPr>
@@ -6155,7 +6101,7 @@
       </p:pic>
       <p:pic>
         <p:nvPicPr>
-          <p:cNvPr descr="preencoded.png" id="218" name="Google Shape;218;p12"/>
+          <p:cNvPr descr="preencoded.png" id="208" name="Google Shape;208;p12"/>
           <p:cNvPicPr preferRelativeResize="0"/>
           <p:nvPr/>
         </p:nvPicPr>
@@ -6182,7 +6128,7 @@
       </p:pic>
       <p:pic>
         <p:nvPicPr>
-          <p:cNvPr descr="preencoded.png" id="219" name="Google Shape;219;p12">
+          <p:cNvPr descr="preencoded.png" id="209" name="Google Shape;209;p12">
             <a:hlinkClick r:id="rId7"/>
           </p:cNvPr>
           <p:cNvPicPr preferRelativeResize="0"/>
@@ -6211,7 +6157,7 @@
       </p:pic>
       <p:pic>
         <p:nvPicPr>
-          <p:cNvPr descr="preencoded.png" id="220" name="Google Shape;220;p12"/>
+          <p:cNvPr descr="preencoded.png" id="210" name="Google Shape;210;p12"/>
           <p:cNvPicPr preferRelativeResize="0"/>
           <p:nvPr/>
         </p:nvPicPr>
@@ -6238,7 +6184,7 @@
       </p:pic>
       <p:sp>
         <p:nvSpPr>
-          <p:cNvPr id="221" name="Google Shape;221;p12"/>
+          <p:cNvPr id="211" name="Google Shape;211;p12"/>
           <p:cNvSpPr/>
           <p:nvPr/>
         </p:nvSpPr>
@@ -6304,14 +6250,14 @@
       </p:sp>
       <p:sp>
         <p:nvSpPr>
-          <p:cNvPr id="222" name="Google Shape;222;p12"/>
+          <p:cNvPr id="212" name="Google Shape;212;p12"/>
           <p:cNvSpPr/>
           <p:nvPr/>
         </p:nvSpPr>
         <p:spPr>
-          <a:xfrm rot="-600">
-            <a:off x="2886075" y="7449792"/>
-            <a:ext cx="8467883" cy="906295"/>
+          <a:xfrm rot="-609">
+            <a:off x="2709446" y="7457881"/>
+            <a:ext cx="8467800" cy="906300"/>
           </a:xfrm>
           <a:prstGeom prst="rect">
             <a:avLst/>
@@ -6327,7 +6273,7 @@
           </a:bodyPr>
           <a:lstStyle/>
           <a:p>
-            <a:pPr indent="0" lvl="0" marL="0" marR="0" rtl="0" algn="ctr">
+            <a:pPr indent="0" lvl="0" marL="0" marR="0" rtl="0" algn="r">
               <a:lnSpc>
                 <a:spcPct val="102007"/>
               </a:lnSpc>
@@ -6637,36 +6583,9 @@
           </a:ln>
         </p:spPr>
       </p:pic>
-      <p:pic>
-        <p:nvPicPr>
-          <p:cNvPr descr="preencoded.png" id="42" name="Google Shape;42;p2"/>
-          <p:cNvPicPr preferRelativeResize="0"/>
-          <p:nvPr/>
-        </p:nvPicPr>
-        <p:blipFill rotWithShape="1">
-          <a:blip r:embed="rId12">
-            <a:alphaModFix/>
-          </a:blip>
-          <a:srcRect b="0" l="0" r="0" t="0"/>
-          <a:stretch/>
-        </p:blipFill>
-        <p:spPr>
-          <a:xfrm>
-            <a:off x="867879" y="6326287"/>
-            <a:ext cx="3876921" cy="706203"/>
-          </a:xfrm>
-          <a:prstGeom prst="rect">
-            <a:avLst/>
-          </a:prstGeom>
-          <a:noFill/>
-          <a:ln>
-            <a:noFill/>
-          </a:ln>
-        </p:spPr>
-      </p:pic>
       <p:sp>
         <p:nvSpPr>
-          <p:cNvPr id="43" name="Google Shape;43;p2"/>
+          <p:cNvPr id="42" name="Google Shape;42;p2"/>
           <p:cNvSpPr/>
           <p:nvPr/>
         </p:nvSpPr>
@@ -6684,7 +6603,7 @@
           </a:ln>
         </p:spPr>
         <p:txBody>
-          <a:bodyPr anchorCtr="0" anchor="t" bIns="0" lIns="0" spcFirstLastPara="1" rIns="0" wrap="square" tIns="0">
+          <a:bodyPr anchorCtr="0" anchor="b" bIns="0" lIns="0" spcFirstLastPara="1" rIns="0" wrap="square" tIns="0">
             <a:noAutofit/>
           </a:bodyPr>
           <a:lstStyle/>
@@ -6721,7 +6640,19 @@
                   </a:ext>
                 </a:extLst>
               </a:rPr>
-              <a:t>Extreme Dynamic Forms</a:t>
+              <a:t>Extreme Dynamic</a:t>
+            </a:r>
+            <a:r>
+              <a:rPr b="1" lang="en-US" sz="4050">
+                <a:solidFill>
+                  <a:srgbClr val="163560"/>
+                </a:solidFill>
+                <a:latin typeface="Poppins"/>
+                <a:ea typeface="Poppins"/>
+                <a:cs typeface="Poppins"/>
+                <a:sym typeface="Poppins"/>
+              </a:rPr>
+              <a:t> Forms</a:t>
             </a:r>
             <a:endParaRPr b="0" i="0" sz="4050" u="none" cap="none" strike="noStrike">
               <a:solidFill>
@@ -6737,7 +6668,7 @@
       </p:sp>
       <p:sp>
         <p:nvSpPr>
-          <p:cNvPr id="44" name="Google Shape;44;p2"/>
+          <p:cNvPr id="43" name="Google Shape;43;p2"/>
           <p:cNvSpPr/>
           <p:nvPr/>
         </p:nvSpPr>
@@ -6803,14 +6734,14 @@
       </p:sp>
       <p:sp>
         <p:nvSpPr>
-          <p:cNvPr id="45" name="Google Shape;45;p2"/>
+          <p:cNvPr id="44" name="Google Shape;44;p2"/>
           <p:cNvSpPr/>
           <p:nvPr/>
         </p:nvSpPr>
         <p:spPr>
-          <a:xfrm rot="-600">
-            <a:off x="1182219" y="6412743"/>
-            <a:ext cx="3362418" cy="533969"/>
+          <a:xfrm rot="-613">
+            <a:off x="991322" y="6388636"/>
+            <a:ext cx="3362400" cy="534000"/>
           </a:xfrm>
           <a:prstGeom prst="rect">
             <a:avLst/>
@@ -6892,7 +6823,7 @@
     </p:bg>
     <p:spTree>
       <p:nvGrpSpPr>
-        <p:cNvPr id="50" name="Shape 50"/>
+        <p:cNvPr id="49" name="Shape 49"/>
         <p:cNvGrpSpPr/>
         <p:nvPr/>
       </p:nvGrpSpPr>
@@ -6906,7 +6837,7 @@
       </p:grpSpPr>
       <p:pic>
         <p:nvPicPr>
-          <p:cNvPr descr="preencoded.png" id="51" name="Google Shape;51;p3"/>
+          <p:cNvPr descr="preencoded.png" id="50" name="Google Shape;50;p3"/>
           <p:cNvPicPr preferRelativeResize="0"/>
           <p:nvPr/>
         </p:nvPicPr>
@@ -6933,7 +6864,7 @@
       </p:pic>
       <p:pic>
         <p:nvPicPr>
-          <p:cNvPr descr="preencoded.png" id="52" name="Google Shape;52;p3"/>
+          <p:cNvPr descr="preencoded.png" id="51" name="Google Shape;51;p3"/>
           <p:cNvPicPr preferRelativeResize="0"/>
           <p:nvPr/>
         </p:nvPicPr>
@@ -6960,7 +6891,7 @@
       </p:pic>
       <p:pic>
         <p:nvPicPr>
-          <p:cNvPr descr="preencoded.png" id="53" name="Google Shape;53;p3">
+          <p:cNvPr descr="preencoded.png" id="52" name="Google Shape;52;p3">
             <a:hlinkClick r:id="rId5"/>
           </p:cNvPr>
           <p:cNvPicPr preferRelativeResize="0"/>
@@ -6989,7 +6920,7 @@
       </p:pic>
       <p:pic>
         <p:nvPicPr>
-          <p:cNvPr descr="preencoded.png" id="54" name="Google Shape;54;p3"/>
+          <p:cNvPr descr="preencoded.png" id="53" name="Google Shape;53;p3"/>
           <p:cNvPicPr preferRelativeResize="0"/>
           <p:nvPr/>
         </p:nvPicPr>
@@ -7016,7 +6947,7 @@
       </p:pic>
       <p:pic>
         <p:nvPicPr>
-          <p:cNvPr descr="preencoded.png" id="55" name="Google Shape;55;p3"/>
+          <p:cNvPr descr="preencoded.png" id="54" name="Google Shape;54;p3"/>
           <p:cNvPicPr preferRelativeResize="0"/>
           <p:nvPr/>
         </p:nvPicPr>
@@ -7043,7 +6974,7 @@
       </p:pic>
       <p:pic>
         <p:nvPicPr>
-          <p:cNvPr descr="preencoded.png" id="56" name="Google Shape;56;p3"/>
+          <p:cNvPr descr="preencoded.png" id="55" name="Google Shape;55;p3"/>
           <p:cNvPicPr preferRelativeResize="0"/>
           <p:nvPr/>
         </p:nvPicPr>
@@ -7070,7 +7001,7 @@
       </p:pic>
       <p:pic>
         <p:nvPicPr>
-          <p:cNvPr descr="preencoded.png" id="57" name="Google Shape;57;p3"/>
+          <p:cNvPr descr="preencoded.png" id="56" name="Google Shape;56;p3"/>
           <p:cNvPicPr preferRelativeResize="0"/>
           <p:nvPr/>
         </p:nvPicPr>
@@ -7083,33 +7014,6 @@
         </p:blipFill>
         <p:spPr>
           <a:xfrm>
-            <a:off x="11040856" y="7915685"/>
-            <a:ext cx="2448171" cy="705704"/>
-          </a:xfrm>
-          <a:prstGeom prst="rect">
-            <a:avLst/>
-          </a:prstGeom>
-          <a:noFill/>
-          <a:ln>
-            <a:noFill/>
-          </a:ln>
-        </p:spPr>
-      </p:pic>
-      <p:pic>
-        <p:nvPicPr>
-          <p:cNvPr descr="preencoded.png" id="58" name="Google Shape;58;p3"/>
-          <p:cNvPicPr preferRelativeResize="0"/>
-          <p:nvPr/>
-        </p:nvPicPr>
-        <p:blipFill rotWithShape="1">
-          <a:blip r:embed="rId11">
-            <a:alphaModFix/>
-          </a:blip>
-          <a:srcRect b="0" l="0" r="0" t="0"/>
-          <a:stretch/>
-        </p:blipFill>
-        <p:spPr>
-          <a:xfrm>
             <a:off x="11039911" y="2495894"/>
             <a:ext cx="2639171" cy="2134521"/>
           </a:xfrm>
@@ -7124,7 +7028,7 @@
       </p:pic>
       <p:sp>
         <p:nvSpPr>
-          <p:cNvPr id="59" name="Google Shape;59;p3"/>
+          <p:cNvPr id="57" name="Google Shape;57;p3"/>
           <p:cNvSpPr/>
           <p:nvPr/>
         </p:nvSpPr>
@@ -7190,7 +7094,7 @@
       </p:sp>
       <p:sp>
         <p:nvSpPr>
-          <p:cNvPr id="60" name="Google Shape;60;p3"/>
+          <p:cNvPr id="58" name="Google Shape;58;p3"/>
           <p:cNvSpPr/>
           <p:nvPr/>
         </p:nvSpPr>
@@ -7208,7 +7112,7 @@
           </a:ln>
         </p:spPr>
         <p:txBody>
-          <a:bodyPr anchorCtr="0" anchor="t" bIns="0" lIns="0" spcFirstLastPara="1" rIns="0" wrap="square" tIns="0">
+          <a:bodyPr anchorCtr="0" anchor="b" bIns="0" lIns="0" spcFirstLastPara="1" rIns="0" wrap="square" tIns="0">
             <a:noAutofit/>
           </a:bodyPr>
           <a:lstStyle/>
@@ -7240,7 +7144,19 @@
                 <a:cs typeface="Poppins"/>
                 <a:sym typeface="Poppins"/>
               </a:rPr>
-              <a:t>Connector for Jira, ServiceNow, AzureDevOps, Freshdesk, Zendesk, Freshservice...</a:t>
+              <a:t>Connector for J</a:t>
+            </a:r>
+            <a:r>
+              <a:rPr b="1" i="0" lang="en-US" sz="4050" u="none" cap="none" strike="noStrike">
+                <a:solidFill>
+                  <a:srgbClr val="163560"/>
+                </a:solidFill>
+                <a:latin typeface="Poppins"/>
+                <a:ea typeface="Poppins"/>
+                <a:cs typeface="Poppins"/>
+                <a:sym typeface="Poppins"/>
+              </a:rPr>
+              <a:t>ira, ServiceNow, AzureDevOps, Freshdesk, Zendesk, Freshservice...</a:t>
             </a:r>
             <a:endParaRPr b="0" i="0" sz="4050" u="none" cap="none" strike="noStrike">
               <a:solidFill>
@@ -7256,14 +7172,14 @@
       </p:sp>
       <p:sp>
         <p:nvSpPr>
-          <p:cNvPr id="61" name="Google Shape;61;p3"/>
+          <p:cNvPr id="59" name="Google Shape;59;p3"/>
           <p:cNvSpPr/>
           <p:nvPr/>
         </p:nvSpPr>
         <p:spPr>
-          <a:xfrm rot="-600">
-            <a:off x="11383771" y="8001897"/>
-            <a:ext cx="1828893" cy="533709"/>
+          <a:xfrm rot="-564">
+            <a:off x="11115349" y="7948232"/>
+            <a:ext cx="1828800" cy="533700"/>
           </a:xfrm>
           <a:prstGeom prst="rect">
             <a:avLst/>
@@ -7340,7 +7256,7 @@
     </p:bg>
     <p:spTree>
       <p:nvGrpSpPr>
-        <p:cNvPr id="66" name="Shape 66"/>
+        <p:cNvPr id="64" name="Shape 64"/>
         <p:cNvGrpSpPr/>
         <p:nvPr/>
       </p:nvGrpSpPr>
@@ -7354,7 +7270,7 @@
       </p:grpSpPr>
       <p:pic>
         <p:nvPicPr>
-          <p:cNvPr descr="preencoded.png" id="67" name="Google Shape;67;p4"/>
+          <p:cNvPr descr="preencoded.png" id="65" name="Google Shape;65;p4"/>
           <p:cNvPicPr preferRelativeResize="0"/>
           <p:nvPr/>
         </p:nvPicPr>
@@ -7381,7 +7297,7 @@
       </p:pic>
       <p:pic>
         <p:nvPicPr>
-          <p:cNvPr descr="preencoded.png" id="68" name="Google Shape;68;p4"/>
+          <p:cNvPr descr="preencoded.png" id="66" name="Google Shape;66;p4"/>
           <p:cNvPicPr preferRelativeResize="0"/>
           <p:nvPr/>
         </p:nvPicPr>
@@ -7408,7 +7324,7 @@
       </p:pic>
       <p:pic>
         <p:nvPicPr>
-          <p:cNvPr descr="preencoded.png" id="69" name="Google Shape;69;p4"/>
+          <p:cNvPr descr="preencoded.png" id="67" name="Google Shape;67;p4"/>
           <p:cNvPicPr preferRelativeResize="0"/>
           <p:nvPr/>
         </p:nvPicPr>
@@ -7435,7 +7351,7 @@
       </p:pic>
       <p:pic>
         <p:nvPicPr>
-          <p:cNvPr descr="preencoded.png" id="70" name="Google Shape;70;p4"/>
+          <p:cNvPr descr="preencoded.png" id="68" name="Google Shape;68;p4"/>
           <p:cNvPicPr preferRelativeResize="0"/>
           <p:nvPr/>
         </p:nvPicPr>
@@ -7448,8 +7364,8 @@
         </p:blipFill>
         <p:spPr>
           <a:xfrm>
-            <a:off x="1039322" y="6288160"/>
-            <a:ext cx="3876921" cy="706203"/>
+            <a:off x="943158" y="1050313"/>
+            <a:ext cx="1343494" cy="1343494"/>
           </a:xfrm>
           <a:prstGeom prst="rect">
             <a:avLst/>
@@ -7462,7 +7378,7 @@
       </p:pic>
       <p:pic>
         <p:nvPicPr>
-          <p:cNvPr descr="preencoded.png" id="71" name="Google Shape;71;p4"/>
+          <p:cNvPr descr="preencoded.png" id="69" name="Google Shape;69;p4"/>
           <p:cNvPicPr preferRelativeResize="0"/>
           <p:nvPr/>
         </p:nvPicPr>
@@ -7475,8 +7391,8 @@
         </p:blipFill>
         <p:spPr>
           <a:xfrm>
-            <a:off x="943158" y="1050313"/>
-            <a:ext cx="1343494" cy="1343494"/>
+            <a:off x="5411522" y="7574912"/>
+            <a:ext cx="1838545" cy="629292"/>
           </a:xfrm>
           <a:prstGeom prst="rect">
             <a:avLst/>
@@ -7489,7 +7405,7 @@
       </p:pic>
       <p:pic>
         <p:nvPicPr>
-          <p:cNvPr descr="preencoded.png" id="72" name="Google Shape;72;p4"/>
+          <p:cNvPr descr="preencoded.png" id="70" name="Google Shape;70;p4"/>
           <p:cNvPicPr preferRelativeResize="0"/>
           <p:nvPr/>
         </p:nvPicPr>
@@ -7502,8 +7418,8 @@
         </p:blipFill>
         <p:spPr>
           <a:xfrm>
-            <a:off x="5411522" y="7574912"/>
-            <a:ext cx="1838545" cy="629292"/>
+            <a:off x="3763895" y="915942"/>
+            <a:ext cx="2848314" cy="972545"/>
           </a:xfrm>
           <a:prstGeom prst="rect">
             <a:avLst/>
@@ -7516,12 +7432,14 @@
       </p:pic>
       <p:pic>
         <p:nvPicPr>
-          <p:cNvPr descr="preencoded.png" id="73" name="Google Shape;73;p4"/>
+          <p:cNvPr descr="preencoded.png" id="71" name="Google Shape;71;p4">
+            <a:hlinkClick r:id="rId9"/>
+          </p:cNvPr>
           <p:cNvPicPr preferRelativeResize="0"/>
           <p:nvPr/>
         </p:nvPicPr>
         <p:blipFill rotWithShape="1">
-          <a:blip r:embed="rId9">
+          <a:blip r:embed="rId10">
             <a:alphaModFix/>
           </a:blip>
           <a:srcRect b="0" l="0" r="0" t="0"/>
@@ -7529,35 +7447,6 @@
         </p:blipFill>
         <p:spPr>
           <a:xfrm>
-            <a:off x="3763895" y="915942"/>
-            <a:ext cx="2848314" cy="972545"/>
-          </a:xfrm>
-          <a:prstGeom prst="rect">
-            <a:avLst/>
-          </a:prstGeom>
-          <a:noFill/>
-          <a:ln>
-            <a:noFill/>
-          </a:ln>
-        </p:spPr>
-      </p:pic>
-      <p:pic>
-        <p:nvPicPr>
-          <p:cNvPr descr="preencoded.png" id="74" name="Google Shape;74;p4">
-            <a:hlinkClick r:id="rId10"/>
-          </p:cNvPr>
-          <p:cNvPicPr preferRelativeResize="0"/>
-          <p:nvPr/>
-        </p:nvPicPr>
-        <p:blipFill rotWithShape="1">
-          <a:blip r:embed="rId11">
-            <a:alphaModFix/>
-          </a:blip>
-          <a:srcRect b="0" l="0" r="0" t="0"/>
-          <a:stretch/>
-        </p:blipFill>
-        <p:spPr>
-          <a:xfrm>
             <a:off x="801683" y="9069632"/>
             <a:ext cx="3505486" cy="820374"/>
           </a:xfrm>
@@ -7572,7 +7461,7 @@
       </p:pic>
       <p:sp>
         <p:nvSpPr>
-          <p:cNvPr id="75" name="Google Shape;75;p4"/>
+          <p:cNvPr id="72" name="Google Shape;72;p4"/>
           <p:cNvSpPr/>
           <p:nvPr/>
         </p:nvSpPr>
@@ -7590,7 +7479,7 @@
           </a:ln>
         </p:spPr>
         <p:txBody>
-          <a:bodyPr anchorCtr="0" anchor="t" bIns="0" lIns="0" spcFirstLastPara="1" rIns="0" wrap="square" tIns="0">
+          <a:bodyPr anchorCtr="0" anchor="b" bIns="0" lIns="0" spcFirstLastPara="1" rIns="0" wrap="square" tIns="0">
             <a:noAutofit/>
           </a:bodyPr>
           <a:lstStyle/>
@@ -7638,14 +7527,14 @@
       </p:sp>
       <p:sp>
         <p:nvSpPr>
-          <p:cNvPr id="76" name="Google Shape;76;p4"/>
+          <p:cNvPr id="73" name="Google Shape;73;p4"/>
           <p:cNvSpPr/>
           <p:nvPr/>
         </p:nvSpPr>
         <p:spPr>
-          <a:xfrm rot="-600">
-            <a:off x="1353662" y="6374611"/>
-            <a:ext cx="3362418" cy="533969"/>
+          <a:xfrm rot="-613">
+            <a:off x="1105090" y="6392504"/>
+            <a:ext cx="3362400" cy="534000"/>
           </a:xfrm>
           <a:prstGeom prst="rect">
             <a:avLst/>
@@ -7704,7 +7593,7 @@
       </p:sp>
       <p:sp>
         <p:nvSpPr>
-          <p:cNvPr id="77" name="Google Shape;77;p4"/>
+          <p:cNvPr id="74" name="Google Shape;74;p4"/>
           <p:cNvSpPr/>
           <p:nvPr/>
         </p:nvSpPr>
@@ -7788,7 +7677,7 @@
     </p:bg>
     <p:spTree>
       <p:nvGrpSpPr>
-        <p:cNvPr id="82" name="Shape 82"/>
+        <p:cNvPr id="79" name="Shape 79"/>
         <p:cNvGrpSpPr/>
         <p:nvPr/>
       </p:nvGrpSpPr>
@@ -7802,7 +7691,7 @@
       </p:grpSpPr>
       <p:pic>
         <p:nvPicPr>
-          <p:cNvPr descr="preencoded.png" id="83" name="Google Shape;83;p5"/>
+          <p:cNvPr descr="preencoded.png" id="80" name="Google Shape;80;p5"/>
           <p:cNvPicPr preferRelativeResize="0"/>
           <p:nvPr/>
         </p:nvPicPr>
@@ -7829,7 +7718,7 @@
       </p:pic>
       <p:pic>
         <p:nvPicPr>
-          <p:cNvPr descr="preencoded.png" id="84" name="Google Shape;84;p5"/>
+          <p:cNvPr descr="preencoded.png" id="81" name="Google Shape;81;p5"/>
           <p:cNvPicPr preferRelativeResize="0"/>
           <p:nvPr/>
         </p:nvPicPr>
@@ -7856,7 +7745,7 @@
       </p:pic>
       <p:pic>
         <p:nvPicPr>
-          <p:cNvPr descr="preencoded.png" id="85" name="Google Shape;85;p5"/>
+          <p:cNvPr descr="preencoded.png" id="82" name="Google Shape;82;p5"/>
           <p:cNvPicPr preferRelativeResize="0"/>
           <p:nvPr/>
         </p:nvPicPr>
@@ -7883,7 +7772,7 @@
       </p:pic>
       <p:pic>
         <p:nvPicPr>
-          <p:cNvPr descr="preencoded.png" id="86" name="Google Shape;86;p5"/>
+          <p:cNvPr descr="preencoded.png" id="83" name="Google Shape;83;p5"/>
           <p:cNvPicPr preferRelativeResize="0"/>
           <p:nvPr/>
         </p:nvPicPr>
@@ -7896,8 +7785,8 @@
         </p:blipFill>
         <p:spPr>
           <a:xfrm>
-            <a:off x="11040856" y="7915686"/>
-            <a:ext cx="2448171" cy="705704"/>
+            <a:off x="11039911" y="2495895"/>
+            <a:ext cx="2639170" cy="2134521"/>
           </a:xfrm>
           <a:prstGeom prst="rect">
             <a:avLst/>
@@ -7910,7 +7799,7 @@
       </p:pic>
       <p:pic>
         <p:nvPicPr>
-          <p:cNvPr descr="preencoded.png" id="87" name="Google Shape;87;p5"/>
+          <p:cNvPr descr="preencoded.png" id="84" name="Google Shape;84;p5"/>
           <p:cNvPicPr preferRelativeResize="0"/>
           <p:nvPr/>
         </p:nvPicPr>
@@ -7923,8 +7812,8 @@
         </p:blipFill>
         <p:spPr>
           <a:xfrm>
-            <a:off x="11039911" y="2495895"/>
-            <a:ext cx="2639170" cy="2134521"/>
+            <a:off x="181655" y="3362615"/>
+            <a:ext cx="10860461" cy="6023697"/>
           </a:xfrm>
           <a:prstGeom prst="rect">
             <a:avLst/>
@@ -7937,7 +7826,7 @@
       </p:pic>
       <p:pic>
         <p:nvPicPr>
-          <p:cNvPr descr="preencoded.png" id="88" name="Google Shape;88;p5"/>
+          <p:cNvPr descr="preencoded.png" id="85" name="Google Shape;85;p5"/>
           <p:cNvPicPr preferRelativeResize="0"/>
           <p:nvPr/>
         </p:nvPicPr>
@@ -7950,8 +7839,8 @@
         </p:blipFill>
         <p:spPr>
           <a:xfrm>
-            <a:off x="181655" y="3362615"/>
-            <a:ext cx="10860461" cy="6023697"/>
+            <a:off x="3962460" y="630829"/>
+            <a:ext cx="1832053" cy="1832053"/>
           </a:xfrm>
           <a:prstGeom prst="rect">
             <a:avLst/>
@@ -7964,7 +7853,7 @@
       </p:pic>
       <p:pic>
         <p:nvPicPr>
-          <p:cNvPr descr="preencoded.png" id="89" name="Google Shape;89;p5"/>
+          <p:cNvPr descr="preencoded.png" id="86" name="Google Shape;86;p5"/>
           <p:cNvPicPr preferRelativeResize="0"/>
           <p:nvPr/>
         </p:nvPicPr>
@@ -7977,8 +7866,8 @@
         </p:blipFill>
         <p:spPr>
           <a:xfrm>
-            <a:off x="3962460" y="630829"/>
-            <a:ext cx="1832053" cy="1832053"/>
+            <a:off x="4311244" y="1006205"/>
+            <a:ext cx="1048116" cy="1048119"/>
           </a:xfrm>
           <a:prstGeom prst="rect">
             <a:avLst/>
@@ -7991,7 +7880,7 @@
       </p:pic>
       <p:pic>
         <p:nvPicPr>
-          <p:cNvPr descr="preencoded.png" id="90" name="Google Shape;90;p5"/>
+          <p:cNvPr descr="preencoded.png" id="87" name="Google Shape;87;p5"/>
           <p:cNvPicPr preferRelativeResize="0"/>
           <p:nvPr/>
         </p:nvPicPr>
@@ -8004,8 +7893,8 @@
         </p:blipFill>
         <p:spPr>
           <a:xfrm>
-            <a:off x="4311244" y="1006205"/>
-            <a:ext cx="1048116" cy="1048119"/>
+            <a:off x="6820144" y="1401765"/>
+            <a:ext cx="1181512" cy="1181512"/>
           </a:xfrm>
           <a:prstGeom prst="rect">
             <a:avLst/>
@@ -8018,7 +7907,7 @@
       </p:pic>
       <p:pic>
         <p:nvPicPr>
-          <p:cNvPr descr="preencoded.png" id="91" name="Google Shape;91;p5"/>
+          <p:cNvPr descr="preencoded.png" id="88" name="Google Shape;88;p5"/>
           <p:cNvPicPr preferRelativeResize="0"/>
           <p:nvPr/>
         </p:nvPicPr>
@@ -8031,8 +7920,8 @@
         </p:blipFill>
         <p:spPr>
           <a:xfrm>
-            <a:off x="6820144" y="1401765"/>
-            <a:ext cx="1181512" cy="1181512"/>
+            <a:off x="14449660" y="1342701"/>
+            <a:ext cx="2848314" cy="972545"/>
           </a:xfrm>
           <a:prstGeom prst="rect">
             <a:avLst/>
@@ -8045,12 +7934,14 @@
       </p:pic>
       <p:pic>
         <p:nvPicPr>
-          <p:cNvPr descr="preencoded.png" id="92" name="Google Shape;92;p5"/>
+          <p:cNvPr descr="preencoded.png" id="89" name="Google Shape;89;p5">
+            <a:hlinkClick r:id="rId12"/>
+          </p:cNvPr>
           <p:cNvPicPr preferRelativeResize="0"/>
           <p:nvPr/>
         </p:nvPicPr>
         <p:blipFill rotWithShape="1">
-          <a:blip r:embed="rId12">
+          <a:blip r:embed="rId13">
             <a:alphaModFix/>
           </a:blip>
           <a:srcRect b="0" l="0" r="0" t="0"/>
@@ -8058,35 +7949,6 @@
         </p:blipFill>
         <p:spPr>
           <a:xfrm>
-            <a:off x="14449660" y="1342701"/>
-            <a:ext cx="2848314" cy="972545"/>
-          </a:xfrm>
-          <a:prstGeom prst="rect">
-            <a:avLst/>
-          </a:prstGeom>
-          <a:noFill/>
-          <a:ln>
-            <a:noFill/>
-          </a:ln>
-        </p:spPr>
-      </p:pic>
-      <p:pic>
-        <p:nvPicPr>
-          <p:cNvPr descr="preencoded.png" id="93" name="Google Shape;93;p5">
-            <a:hlinkClick r:id="rId13"/>
-          </p:cNvPr>
-          <p:cNvPicPr preferRelativeResize="0"/>
-          <p:nvPr/>
-        </p:nvPicPr>
-        <p:blipFill rotWithShape="1">
-          <a:blip r:embed="rId14">
-            <a:alphaModFix/>
-          </a:blip>
-          <a:srcRect b="0" l="0" r="0" t="0"/>
-          <a:stretch/>
-        </p:blipFill>
-        <p:spPr>
-          <a:xfrm>
             <a:off x="13984282" y="9067329"/>
             <a:ext cx="3505486" cy="820374"/>
           </a:xfrm>
@@ -8101,7 +7963,7 @@
       </p:pic>
       <p:sp>
         <p:nvSpPr>
-          <p:cNvPr id="94" name="Google Shape;94;p5"/>
+          <p:cNvPr id="90" name="Google Shape;90;p5"/>
           <p:cNvSpPr/>
           <p:nvPr/>
         </p:nvSpPr>
@@ -8167,7 +8029,7 @@
       </p:sp>
       <p:sp>
         <p:nvSpPr>
-          <p:cNvPr id="95" name="Google Shape;95;p5"/>
+          <p:cNvPr id="91" name="Google Shape;91;p5"/>
           <p:cNvSpPr/>
           <p:nvPr/>
         </p:nvSpPr>
@@ -8185,7 +8047,7 @@
           </a:ln>
         </p:spPr>
         <p:txBody>
-          <a:bodyPr anchorCtr="0" anchor="t" bIns="0" lIns="0" spcFirstLastPara="1" rIns="0" wrap="square" tIns="0">
+          <a:bodyPr anchorCtr="0" anchor="b" bIns="0" lIns="0" spcFirstLastPara="1" rIns="0" wrap="square" tIns="0">
             <a:noAutofit/>
           </a:bodyPr>
           <a:lstStyle/>
@@ -8233,14 +8095,14 @@
       </p:sp>
       <p:sp>
         <p:nvSpPr>
-          <p:cNvPr id="96" name="Google Shape;96;p5"/>
+          <p:cNvPr id="92" name="Google Shape;92;p5"/>
           <p:cNvSpPr/>
           <p:nvPr/>
         </p:nvSpPr>
         <p:spPr>
-          <a:xfrm rot="-600">
-            <a:off x="11383771" y="8001892"/>
-            <a:ext cx="1828893" cy="533709"/>
+          <a:xfrm rot="-564">
+            <a:off x="11042124" y="8037702"/>
+            <a:ext cx="1828800" cy="533700"/>
           </a:xfrm>
           <a:prstGeom prst="rect">
             <a:avLst/>
@@ -8317,7 +8179,7 @@
     </p:bg>
     <p:spTree>
       <p:nvGrpSpPr>
-        <p:cNvPr id="101" name="Shape 101"/>
+        <p:cNvPr id="97" name="Shape 97"/>
         <p:cNvGrpSpPr/>
         <p:nvPr/>
       </p:nvGrpSpPr>
@@ -8331,7 +8193,7 @@
       </p:grpSpPr>
       <p:pic>
         <p:nvPicPr>
-          <p:cNvPr descr="preencoded.png" id="102" name="Google Shape;102;p6"/>
+          <p:cNvPr descr="preencoded.png" id="98" name="Google Shape;98;p6"/>
           <p:cNvPicPr preferRelativeResize="0"/>
           <p:nvPr/>
         </p:nvPicPr>
@@ -8358,7 +8220,7 @@
       </p:pic>
       <p:pic>
         <p:nvPicPr>
-          <p:cNvPr descr="preencoded.png" id="103" name="Google Shape;103;p6">
+          <p:cNvPr descr="preencoded.png" id="99" name="Google Shape;99;p6">
             <a:hlinkClick r:id="rId4"/>
           </p:cNvPr>
           <p:cNvPicPr preferRelativeResize="0"/>
@@ -8387,7 +8249,7 @@
       </p:pic>
       <p:pic>
         <p:nvPicPr>
-          <p:cNvPr descr="preencoded.png" id="104" name="Google Shape;104;p6"/>
+          <p:cNvPr descr="preencoded.png" id="100" name="Google Shape;100;p6"/>
           <p:cNvPicPr preferRelativeResize="0"/>
           <p:nvPr/>
         </p:nvPicPr>
@@ -8414,7 +8276,7 @@
       </p:pic>
       <p:pic>
         <p:nvPicPr>
-          <p:cNvPr descr="preencoded.png" id="105" name="Google Shape;105;p6"/>
+          <p:cNvPr descr="preencoded.png" id="101" name="Google Shape;101;p6"/>
           <p:cNvPicPr preferRelativeResize="0"/>
           <p:nvPr/>
         </p:nvPicPr>
@@ -8427,8 +8289,8 @@
         </p:blipFill>
         <p:spPr>
           <a:xfrm>
-            <a:off x="1086947" y="6288146"/>
-            <a:ext cx="3876921" cy="706203"/>
+            <a:off x="990783" y="1050303"/>
+            <a:ext cx="1343494" cy="1343494"/>
           </a:xfrm>
           <a:prstGeom prst="rect">
             <a:avLst/>
@@ -8441,7 +8303,7 @@
       </p:pic>
       <p:pic>
         <p:nvPicPr>
-          <p:cNvPr descr="preencoded.png" id="106" name="Google Shape;106;p6"/>
+          <p:cNvPr descr="preencoded.png" id="102" name="Google Shape;102;p6"/>
           <p:cNvPicPr preferRelativeResize="0"/>
           <p:nvPr/>
         </p:nvPicPr>
@@ -8454,8 +8316,8 @@
         </p:blipFill>
         <p:spPr>
           <a:xfrm>
-            <a:off x="990783" y="1050303"/>
-            <a:ext cx="1343494" cy="1343494"/>
+            <a:off x="5411522" y="7574911"/>
+            <a:ext cx="1838545" cy="629292"/>
           </a:xfrm>
           <a:prstGeom prst="rect">
             <a:avLst/>
@@ -8468,7 +8330,7 @@
       </p:pic>
       <p:pic>
         <p:nvPicPr>
-          <p:cNvPr descr="preencoded.png" id="107" name="Google Shape;107;p6"/>
+          <p:cNvPr descr="preencoded.png" id="103" name="Google Shape;103;p6"/>
           <p:cNvPicPr preferRelativeResize="0"/>
           <p:nvPr/>
         </p:nvPicPr>
@@ -8481,8 +8343,8 @@
         </p:blipFill>
         <p:spPr>
           <a:xfrm>
-            <a:off x="5411522" y="7574911"/>
-            <a:ext cx="1838545" cy="629292"/>
+            <a:off x="3763895" y="915941"/>
+            <a:ext cx="2848314" cy="972545"/>
           </a:xfrm>
           <a:prstGeom prst="rect">
             <a:avLst/>
@@ -8495,7 +8357,7 @@
       </p:pic>
       <p:pic>
         <p:nvPicPr>
-          <p:cNvPr descr="preencoded.png" id="108" name="Google Shape;108;p6"/>
+          <p:cNvPr descr="preencoded.png" id="104" name="Google Shape;104;p6"/>
           <p:cNvPicPr preferRelativeResize="0"/>
           <p:nvPr/>
         </p:nvPicPr>
@@ -8508,33 +8370,6 @@
         </p:blipFill>
         <p:spPr>
           <a:xfrm>
-            <a:off x="3763895" y="915941"/>
-            <a:ext cx="2848314" cy="972545"/>
-          </a:xfrm>
-          <a:prstGeom prst="rect">
-            <a:avLst/>
-          </a:prstGeom>
-          <a:noFill/>
-          <a:ln>
-            <a:noFill/>
-          </a:ln>
-        </p:spPr>
-      </p:pic>
-      <p:pic>
-        <p:nvPicPr>
-          <p:cNvPr descr="preencoded.png" id="109" name="Google Shape;109;p6"/>
-          <p:cNvPicPr preferRelativeResize="0"/>
-          <p:nvPr/>
-        </p:nvPicPr>
-        <p:blipFill rotWithShape="1">
-          <a:blip r:embed="rId11">
-            <a:alphaModFix/>
-          </a:blip>
-          <a:srcRect b="0" l="0" r="0" t="0"/>
-          <a:stretch/>
-        </p:blipFill>
-        <p:spPr>
-          <a:xfrm>
             <a:off x="6953448" y="855707"/>
             <a:ext cx="11336348" cy="7645096"/>
           </a:xfrm>
@@ -8549,7 +8384,7 @@
       </p:pic>
       <p:sp>
         <p:nvSpPr>
-          <p:cNvPr id="110" name="Google Shape;110;p6"/>
+          <p:cNvPr id="105" name="Google Shape;105;p6"/>
           <p:cNvSpPr/>
           <p:nvPr/>
         </p:nvSpPr>
@@ -8567,7 +8402,7 @@
           </a:ln>
         </p:spPr>
         <p:txBody>
-          <a:bodyPr anchorCtr="0" anchor="t" bIns="0" lIns="0" spcFirstLastPara="1" rIns="0" wrap="square" tIns="0">
+          <a:bodyPr anchorCtr="0" anchor="b" bIns="0" lIns="0" spcFirstLastPara="1" rIns="0" wrap="square" tIns="0">
             <a:noAutofit/>
           </a:bodyPr>
           <a:lstStyle/>
@@ -8599,7 +8434,19 @@
                 <a:cs typeface="Poppins"/>
                 <a:sym typeface="Poppins"/>
               </a:rPr>
-              <a:t>Extreme Dynamic Forms</a:t>
+              <a:t>Extreme</a:t>
+            </a:r>
+            <a:r>
+              <a:rPr b="1" i="0" lang="en-US" sz="4050" u="none" cap="none" strike="noStrike">
+                <a:solidFill>
+                  <a:srgbClr val="163560"/>
+                </a:solidFill>
+                <a:latin typeface="Poppins"/>
+                <a:ea typeface="Poppins"/>
+                <a:cs typeface="Poppins"/>
+                <a:sym typeface="Poppins"/>
+              </a:rPr>
+              <a:t> Dynamic Forms</a:t>
             </a:r>
             <a:endParaRPr b="0" i="0" sz="4050" u="none" cap="none" strike="noStrike">
               <a:solidFill>
@@ -8615,14 +8462,14 @@
       </p:sp>
       <p:sp>
         <p:nvSpPr>
-          <p:cNvPr id="111" name="Google Shape;111;p6"/>
+          <p:cNvPr id="106" name="Google Shape;106;p6"/>
           <p:cNvSpPr/>
           <p:nvPr/>
         </p:nvSpPr>
         <p:spPr>
-          <a:xfrm rot="-600">
-            <a:off x="1401287" y="6374602"/>
-            <a:ext cx="3362418" cy="533969"/>
+          <a:xfrm rot="-613">
+            <a:off x="1133665" y="6374595"/>
+            <a:ext cx="3362400" cy="534000"/>
           </a:xfrm>
           <a:prstGeom prst="rect">
             <a:avLst/>
@@ -8681,7 +8528,7 @@
       </p:sp>
       <p:sp>
         <p:nvSpPr>
-          <p:cNvPr id="112" name="Google Shape;112;p6"/>
+          <p:cNvPr id="107" name="Google Shape;107;p6"/>
           <p:cNvSpPr/>
           <p:nvPr/>
         </p:nvSpPr>
@@ -8765,7 +8612,7 @@
     </p:bg>
     <p:spTree>
       <p:nvGrpSpPr>
-        <p:cNvPr id="117" name="Shape 117"/>
+        <p:cNvPr id="112" name="Shape 112"/>
         <p:cNvGrpSpPr/>
         <p:nvPr/>
       </p:nvGrpSpPr>
@@ -8779,7 +8626,7 @@
       </p:grpSpPr>
       <p:pic>
         <p:nvPicPr>
-          <p:cNvPr descr="preencoded.png" id="118" name="Google Shape;118;p7"/>
+          <p:cNvPr descr="preencoded.png" id="113" name="Google Shape;113;p7"/>
           <p:cNvPicPr preferRelativeResize="0"/>
           <p:nvPr/>
         </p:nvPicPr>
@@ -8806,7 +8653,7 @@
       </p:pic>
       <p:pic>
         <p:nvPicPr>
-          <p:cNvPr descr="preencoded.png" id="119" name="Google Shape;119;p7"/>
+          <p:cNvPr descr="preencoded.png" id="114" name="Google Shape;114;p7"/>
           <p:cNvPicPr preferRelativeResize="0"/>
           <p:nvPr/>
         </p:nvPicPr>
@@ -8833,7 +8680,7 @@
       </p:pic>
       <p:pic>
         <p:nvPicPr>
-          <p:cNvPr descr="preencoded.png" id="120" name="Google Shape;120;p7"/>
+          <p:cNvPr descr="preencoded.png" id="115" name="Google Shape;115;p7"/>
           <p:cNvPicPr preferRelativeResize="0"/>
           <p:nvPr/>
         </p:nvPicPr>
@@ -8860,7 +8707,7 @@
       </p:pic>
       <p:pic>
         <p:nvPicPr>
-          <p:cNvPr descr="preencoded.png" id="121" name="Google Shape;121;p7"/>
+          <p:cNvPr descr="preencoded.png" id="116" name="Google Shape;116;p7"/>
           <p:cNvPicPr preferRelativeResize="0"/>
           <p:nvPr/>
         </p:nvPicPr>
@@ -8887,7 +8734,7 @@
       </p:pic>
       <p:pic>
         <p:nvPicPr>
-          <p:cNvPr descr="preencoded.png" id="122" name="Google Shape;122;p7"/>
+          <p:cNvPr descr="preencoded.png" id="117" name="Google Shape;117;p7"/>
           <p:cNvPicPr preferRelativeResize="0"/>
           <p:nvPr/>
         </p:nvPicPr>
@@ -8914,7 +8761,7 @@
       </p:pic>
       <p:pic>
         <p:nvPicPr>
-          <p:cNvPr descr="preencoded.png" id="123" name="Google Shape;123;p7"/>
+          <p:cNvPr descr="preencoded.png" id="118" name="Google Shape;118;p7"/>
           <p:cNvPicPr preferRelativeResize="0"/>
           <p:nvPr/>
         </p:nvPicPr>
@@ -8927,8 +8774,8 @@
         </p:blipFill>
         <p:spPr>
           <a:xfrm>
-            <a:off x="11040856" y="7915686"/>
-            <a:ext cx="2448171" cy="705704"/>
+            <a:off x="11039911" y="2495891"/>
+            <a:ext cx="2639170" cy="2134526"/>
           </a:xfrm>
           <a:prstGeom prst="rect">
             <a:avLst/>
@@ -8941,7 +8788,7 @@
       </p:pic>
       <p:pic>
         <p:nvPicPr>
-          <p:cNvPr descr="preencoded.png" id="124" name="Google Shape;124;p7"/>
+          <p:cNvPr descr="preencoded.png" id="119" name="Google Shape;119;p7"/>
           <p:cNvPicPr preferRelativeResize="0"/>
           <p:nvPr/>
         </p:nvPicPr>
@@ -8954,8 +8801,8 @@
         </p:blipFill>
         <p:spPr>
           <a:xfrm>
-            <a:off x="11039911" y="2495891"/>
-            <a:ext cx="2639170" cy="2134526"/>
+            <a:off x="829226" y="4688134"/>
+            <a:ext cx="7020816" cy="5106619"/>
           </a:xfrm>
           <a:prstGeom prst="rect">
             <a:avLst/>
@@ -8968,7 +8815,7 @@
       </p:pic>
       <p:pic>
         <p:nvPicPr>
-          <p:cNvPr descr="preencoded.png" id="125" name="Google Shape;125;p7"/>
+          <p:cNvPr descr="preencoded.png" id="120" name="Google Shape;120;p7"/>
           <p:cNvPicPr preferRelativeResize="0"/>
           <p:nvPr/>
         </p:nvPicPr>
@@ -8981,8 +8828,8 @@
         </p:blipFill>
         <p:spPr>
           <a:xfrm>
-            <a:off x="829226" y="4688134"/>
-            <a:ext cx="7020816" cy="5106619"/>
+            <a:off x="2400391" y="525625"/>
+            <a:ext cx="2934375" cy="1934599"/>
           </a:xfrm>
           <a:prstGeom prst="rect">
             <a:avLst/>
@@ -8995,7 +8842,7 @@
       </p:pic>
       <p:pic>
         <p:nvPicPr>
-          <p:cNvPr descr="preencoded.png" id="126" name="Google Shape;126;p7"/>
+          <p:cNvPr descr="preencoded.png" id="121" name="Google Shape;121;p7"/>
           <p:cNvPicPr preferRelativeResize="0"/>
           <p:nvPr/>
         </p:nvPicPr>
@@ -9008,8 +8855,8 @@
         </p:blipFill>
         <p:spPr>
           <a:xfrm>
-            <a:off x="2400391" y="525625"/>
-            <a:ext cx="2934375" cy="1934599"/>
+            <a:off x="5352445" y="2811765"/>
+            <a:ext cx="2076729" cy="1600571"/>
           </a:xfrm>
           <a:prstGeom prst="rect">
             <a:avLst/>
@@ -9022,7 +8869,7 @@
       </p:pic>
       <p:pic>
         <p:nvPicPr>
-          <p:cNvPr descr="preencoded.png" id="127" name="Google Shape;127;p7"/>
+          <p:cNvPr descr="preencoded.png" id="122" name="Google Shape;122;p7"/>
           <p:cNvPicPr preferRelativeResize="0"/>
           <p:nvPr/>
         </p:nvPicPr>
@@ -9035,8 +8882,8 @@
         </p:blipFill>
         <p:spPr>
           <a:xfrm>
-            <a:off x="5352445" y="2811765"/>
-            <a:ext cx="2076729" cy="1600571"/>
+            <a:off x="810168" y="3116625"/>
+            <a:ext cx="3172244" cy="1201257"/>
           </a:xfrm>
           <a:prstGeom prst="rect">
             <a:avLst/>
@@ -9049,12 +8896,14 @@
       </p:pic>
       <p:pic>
         <p:nvPicPr>
-          <p:cNvPr descr="preencoded.png" id="128" name="Google Shape;128;p7"/>
+          <p:cNvPr descr="preencoded.png" id="123" name="Google Shape;123;p7">
+            <a:hlinkClick r:id="rId13"/>
+          </p:cNvPr>
           <p:cNvPicPr preferRelativeResize="0"/>
           <p:nvPr/>
         </p:nvPicPr>
         <p:blipFill rotWithShape="1">
-          <a:blip r:embed="rId13">
+          <a:blip r:embed="rId14">
             <a:alphaModFix/>
           </a:blip>
           <a:srcRect b="0" l="0" r="0" t="0"/>
@@ -9062,35 +8911,6 @@
         </p:blipFill>
         <p:spPr>
           <a:xfrm>
-            <a:off x="810168" y="3116625"/>
-            <a:ext cx="3172244" cy="1201257"/>
-          </a:xfrm>
-          <a:prstGeom prst="rect">
-            <a:avLst/>
-          </a:prstGeom>
-          <a:noFill/>
-          <a:ln>
-            <a:noFill/>
-          </a:ln>
-        </p:spPr>
-      </p:pic>
-      <p:pic>
-        <p:nvPicPr>
-          <p:cNvPr descr="preencoded.png" id="129" name="Google Shape;129;p7">
-            <a:hlinkClick r:id="rId14"/>
-          </p:cNvPr>
-          <p:cNvPicPr preferRelativeResize="0"/>
-          <p:nvPr/>
-        </p:nvPicPr>
-        <p:blipFill rotWithShape="1">
-          <a:blip r:embed="rId15">
-            <a:alphaModFix/>
-          </a:blip>
-          <a:srcRect b="0" l="0" r="0" t="0"/>
-          <a:stretch/>
-        </p:blipFill>
-        <p:spPr>
-          <a:xfrm>
             <a:off x="13984282" y="9067338"/>
             <a:ext cx="3505486" cy="820374"/>
           </a:xfrm>
@@ -9105,7 +8925,7 @@
       </p:pic>
       <p:sp>
         <p:nvSpPr>
-          <p:cNvPr id="130" name="Google Shape;130;p7"/>
+          <p:cNvPr id="124" name="Google Shape;124;p7"/>
           <p:cNvSpPr/>
           <p:nvPr/>
         </p:nvSpPr>
@@ -9171,7 +8991,7 @@
       </p:sp>
       <p:sp>
         <p:nvSpPr>
-          <p:cNvPr id="131" name="Google Shape;131;p7"/>
+          <p:cNvPr id="125" name="Google Shape;125;p7"/>
           <p:cNvSpPr/>
           <p:nvPr/>
         </p:nvSpPr>
@@ -9189,7 +9009,7 @@
           </a:ln>
         </p:spPr>
         <p:txBody>
-          <a:bodyPr anchorCtr="0" anchor="t" bIns="0" lIns="0" spcFirstLastPara="1" rIns="0" wrap="square" tIns="0">
+          <a:bodyPr anchorCtr="0" anchor="b" bIns="0" lIns="0" spcFirstLastPara="1" rIns="0" wrap="square" tIns="0">
             <a:noAutofit/>
           </a:bodyPr>
           <a:lstStyle/>
@@ -9237,14 +9057,14 @@
       </p:sp>
       <p:sp>
         <p:nvSpPr>
-          <p:cNvPr id="132" name="Google Shape;132;p7"/>
+          <p:cNvPr id="126" name="Google Shape;126;p7"/>
           <p:cNvSpPr/>
           <p:nvPr/>
         </p:nvSpPr>
         <p:spPr>
-          <a:xfrm rot="-600">
-            <a:off x="11383771" y="8001892"/>
-            <a:ext cx="1828893" cy="533709"/>
+          <a:xfrm rot="-564">
+            <a:off x="11089012" y="7894577"/>
+            <a:ext cx="1828800" cy="533700"/>
           </a:xfrm>
           <a:prstGeom prst="rect">
             <a:avLst/>
@@ -9321,7 +9141,7 @@
     </p:bg>
     <p:spTree>
       <p:nvGrpSpPr>
-        <p:cNvPr id="137" name="Shape 137"/>
+        <p:cNvPr id="131" name="Shape 131"/>
         <p:cNvGrpSpPr/>
         <p:nvPr/>
       </p:nvGrpSpPr>
@@ -9335,7 +9155,7 @@
       </p:grpSpPr>
       <p:pic>
         <p:nvPicPr>
-          <p:cNvPr descr="preencoded.png" id="138" name="Google Shape;138;p8"/>
+          <p:cNvPr descr="preencoded.png" id="132" name="Google Shape;132;p8"/>
           <p:cNvPicPr preferRelativeResize="0"/>
           <p:nvPr/>
         </p:nvPicPr>
@@ -9362,7 +9182,7 @@
       </p:pic>
       <p:pic>
         <p:nvPicPr>
-          <p:cNvPr descr="preencoded.png" id="139" name="Google Shape;139;p8">
+          <p:cNvPr descr="preencoded.png" id="133" name="Google Shape;133;p8">
             <a:hlinkClick r:id="rId4"/>
           </p:cNvPr>
           <p:cNvPicPr preferRelativeResize="0"/>
@@ -9391,7 +9211,7 @@
       </p:pic>
       <p:pic>
         <p:nvPicPr>
-          <p:cNvPr descr="preencoded.png" id="140" name="Google Shape;140;p8"/>
+          <p:cNvPr descr="preencoded.png" id="134" name="Google Shape;134;p8"/>
           <p:cNvPicPr preferRelativeResize="0"/>
           <p:nvPr/>
         </p:nvPicPr>
@@ -9418,7 +9238,7 @@
       </p:pic>
       <p:pic>
         <p:nvPicPr>
-          <p:cNvPr descr="preencoded.png" id="141" name="Google Shape;141;p8"/>
+          <p:cNvPr descr="preencoded.png" id="135" name="Google Shape;135;p8"/>
           <p:cNvPicPr preferRelativeResize="0"/>
           <p:nvPr/>
         </p:nvPicPr>
@@ -9431,8 +9251,8 @@
         </p:blipFill>
         <p:spPr>
           <a:xfrm>
-            <a:off x="1086947" y="6288159"/>
-            <a:ext cx="3876921" cy="706203"/>
+            <a:off x="990783" y="1050298"/>
+            <a:ext cx="1343494" cy="1343494"/>
           </a:xfrm>
           <a:prstGeom prst="rect">
             <a:avLst/>
@@ -9445,7 +9265,7 @@
       </p:pic>
       <p:pic>
         <p:nvPicPr>
-          <p:cNvPr descr="preencoded.png" id="142" name="Google Shape;142;p8"/>
+          <p:cNvPr descr="preencoded.png" id="136" name="Google Shape;136;p8"/>
           <p:cNvPicPr preferRelativeResize="0"/>
           <p:nvPr/>
         </p:nvPicPr>
@@ -9458,8 +9278,8 @@
         </p:blipFill>
         <p:spPr>
           <a:xfrm>
-            <a:off x="990783" y="1050298"/>
-            <a:ext cx="1343494" cy="1343494"/>
+            <a:off x="5411522" y="7574902"/>
+            <a:ext cx="1838545" cy="629292"/>
           </a:xfrm>
           <a:prstGeom prst="rect">
             <a:avLst/>
@@ -9472,7 +9292,7 @@
       </p:pic>
       <p:pic>
         <p:nvPicPr>
-          <p:cNvPr descr="preencoded.png" id="143" name="Google Shape;143;p8"/>
+          <p:cNvPr descr="preencoded.png" id="137" name="Google Shape;137;p8"/>
           <p:cNvPicPr preferRelativeResize="0"/>
           <p:nvPr/>
         </p:nvPicPr>
@@ -9485,8 +9305,8 @@
         </p:blipFill>
         <p:spPr>
           <a:xfrm>
-            <a:off x="5411522" y="7574902"/>
-            <a:ext cx="1838545" cy="629292"/>
+            <a:off x="3763896" y="915941"/>
+            <a:ext cx="2848314" cy="972544"/>
           </a:xfrm>
           <a:prstGeom prst="rect">
             <a:avLst/>
@@ -9499,7 +9319,7 @@
       </p:pic>
       <p:pic>
         <p:nvPicPr>
-          <p:cNvPr descr="preencoded.png" id="144" name="Google Shape;144;p8"/>
+          <p:cNvPr descr="preencoded.png" id="138" name="Google Shape;138;p8"/>
           <p:cNvPicPr preferRelativeResize="0"/>
           <p:nvPr/>
         </p:nvPicPr>
@@ -9512,8 +9332,8 @@
         </p:blipFill>
         <p:spPr>
           <a:xfrm>
-            <a:off x="3763896" y="915941"/>
-            <a:ext cx="2848314" cy="972544"/>
+            <a:off x="12182687" y="828053"/>
+            <a:ext cx="5269790" cy="7713241"/>
           </a:xfrm>
           <a:prstGeom prst="rect">
             <a:avLst/>
@@ -9526,7 +9346,7 @@
       </p:pic>
       <p:pic>
         <p:nvPicPr>
-          <p:cNvPr descr="preencoded.png" id="145" name="Google Shape;145;p8"/>
+          <p:cNvPr descr="preencoded.png" id="139" name="Google Shape;139;p8"/>
           <p:cNvPicPr preferRelativeResize="0"/>
           <p:nvPr/>
         </p:nvPicPr>
@@ -9539,8 +9359,8 @@
         </p:blipFill>
         <p:spPr>
           <a:xfrm>
-            <a:off x="12182687" y="828053"/>
-            <a:ext cx="5269790" cy="7713241"/>
+            <a:off x="10944311" y="495561"/>
+            <a:ext cx="2934375" cy="1934599"/>
           </a:xfrm>
           <a:prstGeom prst="rect">
             <a:avLst/>
@@ -9553,7 +9373,7 @@
       </p:pic>
       <p:pic>
         <p:nvPicPr>
-          <p:cNvPr descr="preencoded.png" id="146" name="Google Shape;146;p8"/>
+          <p:cNvPr descr="preencoded.png" id="140" name="Google Shape;140;p8"/>
           <p:cNvPicPr preferRelativeResize="0"/>
           <p:nvPr/>
         </p:nvPicPr>
@@ -9566,8 +9386,8 @@
         </p:blipFill>
         <p:spPr>
           <a:xfrm>
-            <a:off x="10944311" y="495561"/>
-            <a:ext cx="2934375" cy="1934599"/>
+            <a:off x="9039941" y="3724974"/>
+            <a:ext cx="3057918" cy="1775668"/>
           </a:xfrm>
           <a:prstGeom prst="rect">
             <a:avLst/>
@@ -9580,7 +9400,7 @@
       </p:pic>
       <p:pic>
         <p:nvPicPr>
-          <p:cNvPr descr="preencoded.png" id="147" name="Google Shape;147;p8"/>
+          <p:cNvPr descr="preencoded.png" id="141" name="Google Shape;141;p8"/>
           <p:cNvPicPr preferRelativeResize="0"/>
           <p:nvPr/>
         </p:nvPicPr>
@@ -9593,33 +9413,6 @@
         </p:blipFill>
         <p:spPr>
           <a:xfrm>
-            <a:off x="9039941" y="3724974"/>
-            <a:ext cx="3057918" cy="1775668"/>
-          </a:xfrm>
-          <a:prstGeom prst="rect">
-            <a:avLst/>
-          </a:prstGeom>
-          <a:noFill/>
-          <a:ln>
-            <a:noFill/>
-          </a:ln>
-        </p:spPr>
-      </p:pic>
-      <p:pic>
-        <p:nvPicPr>
-          <p:cNvPr descr="preencoded.png" id="148" name="Google Shape;148;p8"/>
-          <p:cNvPicPr preferRelativeResize="0"/>
-          <p:nvPr/>
-        </p:nvPicPr>
-        <p:blipFill rotWithShape="1">
-          <a:blip r:embed="rId14">
-            <a:alphaModFix/>
-          </a:blip>
-          <a:srcRect b="0" l="0" r="0" t="0"/>
-          <a:stretch/>
-        </p:blipFill>
-        <p:spPr>
-          <a:xfrm>
             <a:off x="8211591" y="5582461"/>
             <a:ext cx="3181802" cy="1943974"/>
           </a:xfrm>
@@ -9634,7 +9427,7 @@
       </p:pic>
       <p:sp>
         <p:nvSpPr>
-          <p:cNvPr id="149" name="Google Shape;149;p8"/>
+          <p:cNvPr id="142" name="Google Shape;142;p8"/>
           <p:cNvSpPr/>
           <p:nvPr/>
         </p:nvSpPr>
@@ -9652,7 +9445,7 @@
           </a:ln>
         </p:spPr>
         <p:txBody>
-          <a:bodyPr anchorCtr="0" anchor="t" bIns="0" lIns="0" spcFirstLastPara="1" rIns="0" wrap="square" tIns="0">
+          <a:bodyPr anchorCtr="0" anchor="b" bIns="0" lIns="0" spcFirstLastPara="1" rIns="0" wrap="square" tIns="0">
             <a:noAutofit/>
           </a:bodyPr>
           <a:lstStyle/>
@@ -9700,14 +9493,14 @@
       </p:sp>
       <p:sp>
         <p:nvSpPr>
-          <p:cNvPr id="150" name="Google Shape;150;p8"/>
+          <p:cNvPr id="143" name="Google Shape;143;p8"/>
           <p:cNvSpPr/>
           <p:nvPr/>
         </p:nvSpPr>
         <p:spPr>
-          <a:xfrm rot="-600">
-            <a:off x="1401287" y="6374606"/>
-            <a:ext cx="3362418" cy="533969"/>
+          <a:xfrm rot="-613">
+            <a:off x="1162240" y="6392474"/>
+            <a:ext cx="3362400" cy="534000"/>
           </a:xfrm>
           <a:prstGeom prst="rect">
             <a:avLst/>
@@ -9766,7 +9559,7 @@
       </p:sp>
       <p:sp>
         <p:nvSpPr>
-          <p:cNvPr id="151" name="Google Shape;151;p8"/>
+          <p:cNvPr id="144" name="Google Shape;144;p8"/>
           <p:cNvSpPr/>
           <p:nvPr/>
         </p:nvSpPr>
@@ -9850,7 +9643,7 @@
     </p:bg>
     <p:spTree>
       <p:nvGrpSpPr>
-        <p:cNvPr id="156" name="Shape 156"/>
+        <p:cNvPr id="149" name="Shape 149"/>
         <p:cNvGrpSpPr/>
         <p:nvPr/>
       </p:nvGrpSpPr>
@@ -9864,7 +9657,7 @@
       </p:grpSpPr>
       <p:pic>
         <p:nvPicPr>
-          <p:cNvPr descr="preencoded.png" id="157" name="Google Shape;157;p9"/>
+          <p:cNvPr descr="preencoded.png" id="150" name="Google Shape;150;p9"/>
           <p:cNvPicPr preferRelativeResize="0"/>
           <p:nvPr/>
         </p:nvPicPr>
@@ -9891,7 +9684,7 @@
       </p:pic>
       <p:pic>
         <p:nvPicPr>
-          <p:cNvPr descr="preencoded.png" id="158" name="Google Shape;158;p9"/>
+          <p:cNvPr descr="preencoded.png" id="151" name="Google Shape;151;p9"/>
           <p:cNvPicPr preferRelativeResize="0"/>
           <p:nvPr/>
         </p:nvPicPr>
@@ -9918,7 +9711,7 @@
       </p:pic>
       <p:pic>
         <p:nvPicPr>
-          <p:cNvPr descr="preencoded.png" id="159" name="Google Shape;159;p9"/>
+          <p:cNvPr descr="preencoded.png" id="152" name="Google Shape;152;p9"/>
           <p:cNvPicPr preferRelativeResize="0"/>
           <p:nvPr/>
         </p:nvPicPr>
@@ -9945,7 +9738,7 @@
       </p:pic>
       <p:pic>
         <p:nvPicPr>
-          <p:cNvPr descr="preencoded.png" id="160" name="Google Shape;160;p9"/>
+          <p:cNvPr descr="preencoded.png" id="153" name="Google Shape;153;p9"/>
           <p:cNvPicPr preferRelativeResize="0"/>
           <p:nvPr/>
         </p:nvPicPr>
@@ -9958,8 +9751,8 @@
         </p:blipFill>
         <p:spPr>
           <a:xfrm>
-            <a:off x="11040856" y="7915686"/>
-            <a:ext cx="2448171" cy="705704"/>
+            <a:off x="11039911" y="2495891"/>
+            <a:ext cx="2639170" cy="2134526"/>
           </a:xfrm>
           <a:prstGeom prst="rect">
             <a:avLst/>
@@ -9972,7 +9765,7 @@
       </p:pic>
       <p:pic>
         <p:nvPicPr>
-          <p:cNvPr descr="preencoded.png" id="161" name="Google Shape;161;p9"/>
+          <p:cNvPr descr="preencoded.png" id="154" name="Google Shape;154;p9"/>
           <p:cNvPicPr preferRelativeResize="0"/>
           <p:nvPr/>
         </p:nvPicPr>
@@ -9985,8 +9778,8 @@
         </p:blipFill>
         <p:spPr>
           <a:xfrm>
-            <a:off x="11039911" y="2495891"/>
-            <a:ext cx="2639170" cy="2134526"/>
+            <a:off x="1581888" y="4231591"/>
+            <a:ext cx="1191037" cy="1181522"/>
           </a:xfrm>
           <a:prstGeom prst="rect">
             <a:avLst/>
@@ -9999,7 +9792,7 @@
       </p:pic>
       <p:pic>
         <p:nvPicPr>
-          <p:cNvPr descr="preencoded.png" id="162" name="Google Shape;162;p9"/>
+          <p:cNvPr descr="preencoded.png" id="155" name="Google Shape;155;p9"/>
           <p:cNvPicPr preferRelativeResize="0"/>
           <p:nvPr/>
         </p:nvPicPr>
@@ -10012,8 +9805,8 @@
         </p:blipFill>
         <p:spPr>
           <a:xfrm>
-            <a:off x="1581888" y="4231591"/>
-            <a:ext cx="1191037" cy="1181522"/>
+            <a:off x="3849402" y="7460188"/>
+            <a:ext cx="1171994" cy="1200559"/>
           </a:xfrm>
           <a:prstGeom prst="rect">
             <a:avLst/>
@@ -10026,7 +9819,7 @@
       </p:pic>
       <p:pic>
         <p:nvPicPr>
-          <p:cNvPr descr="preencoded.png" id="163" name="Google Shape;163;p9"/>
+          <p:cNvPr descr="preencoded.png" id="156" name="Google Shape;156;p9"/>
           <p:cNvPicPr preferRelativeResize="0"/>
           <p:nvPr/>
         </p:nvPicPr>
@@ -10039,8 +9832,8 @@
         </p:blipFill>
         <p:spPr>
           <a:xfrm>
-            <a:off x="3849402" y="7460188"/>
-            <a:ext cx="1171994" cy="1200559"/>
+            <a:off x="1883317" y="2312724"/>
+            <a:ext cx="7041023" cy="5869857"/>
           </a:xfrm>
           <a:prstGeom prst="rect">
             <a:avLst/>
@@ -10053,7 +9846,7 @@
       </p:pic>
       <p:pic>
         <p:nvPicPr>
-          <p:cNvPr descr="preencoded.png" id="164" name="Google Shape;164;p9"/>
+          <p:cNvPr descr="preencoded.png" id="157" name="Google Shape;157;p9"/>
           <p:cNvPicPr preferRelativeResize="0"/>
           <p:nvPr/>
         </p:nvPicPr>
@@ -10066,8 +9859,8 @@
         </p:blipFill>
         <p:spPr>
           <a:xfrm>
-            <a:off x="1883317" y="2312724"/>
-            <a:ext cx="7041023" cy="5869857"/>
+            <a:off x="6906558" y="4686850"/>
+            <a:ext cx="3019425" cy="1419594"/>
           </a:xfrm>
           <a:prstGeom prst="rect">
             <a:avLst/>
@@ -10080,7 +9873,7 @@
       </p:pic>
       <p:pic>
         <p:nvPicPr>
-          <p:cNvPr descr="preencoded.png" id="165" name="Google Shape;165;p9"/>
+          <p:cNvPr descr="preencoded.png" id="158" name="Google Shape;158;p9"/>
           <p:cNvPicPr preferRelativeResize="0"/>
           <p:nvPr/>
         </p:nvPicPr>
@@ -10093,8 +9886,8 @@
         </p:blipFill>
         <p:spPr>
           <a:xfrm>
-            <a:off x="6906558" y="4686850"/>
-            <a:ext cx="3019425" cy="1419594"/>
+            <a:off x="0" y="4366144"/>
+            <a:ext cx="4269578" cy="2020407"/>
           </a:xfrm>
           <a:prstGeom prst="rect">
             <a:avLst/>
@@ -10107,7 +9900,7 @@
       </p:pic>
       <p:pic>
         <p:nvPicPr>
-          <p:cNvPr descr="preencoded.png" id="166" name="Google Shape;166;p9"/>
+          <p:cNvPr descr="preencoded.png" id="159" name="Google Shape;159;p9"/>
           <p:cNvPicPr preferRelativeResize="0"/>
           <p:nvPr/>
         </p:nvPicPr>
@@ -10120,8 +9913,8 @@
         </p:blipFill>
         <p:spPr>
           <a:xfrm>
-            <a:off x="0" y="4366144"/>
-            <a:ext cx="4269578" cy="2020407"/>
+            <a:off x="4258898" y="7012031"/>
+            <a:ext cx="2334440" cy="2334440"/>
           </a:xfrm>
           <a:prstGeom prst="rect">
             <a:avLst/>
@@ -10134,7 +9927,7 @@
       </p:pic>
       <p:pic>
         <p:nvPicPr>
-          <p:cNvPr descr="preencoded.png" id="167" name="Google Shape;167;p9"/>
+          <p:cNvPr descr="preencoded.png" id="160" name="Google Shape;160;p9"/>
           <p:cNvPicPr preferRelativeResize="0"/>
           <p:nvPr/>
         </p:nvPicPr>
@@ -10147,8 +9940,8 @@
         </p:blipFill>
         <p:spPr>
           <a:xfrm>
-            <a:off x="4258898" y="7012031"/>
-            <a:ext cx="2334440" cy="2334440"/>
+            <a:off x="3114742" y="382067"/>
+            <a:ext cx="4553997" cy="3001964"/>
           </a:xfrm>
           <a:prstGeom prst="rect">
             <a:avLst/>
@@ -10161,7 +9954,7 @@
       </p:pic>
       <p:pic>
         <p:nvPicPr>
-          <p:cNvPr descr="preencoded.png" id="168" name="Google Shape;168;p9"/>
+          <p:cNvPr descr="preencoded.png" id="161" name="Google Shape;161;p9"/>
           <p:cNvPicPr preferRelativeResize="0"/>
           <p:nvPr/>
         </p:nvPicPr>
@@ -10174,8 +9967,8 @@
         </p:blipFill>
         <p:spPr>
           <a:xfrm>
-            <a:off x="3114742" y="382067"/>
-            <a:ext cx="4553997" cy="3001964"/>
+            <a:off x="1360" y="2202"/>
+            <a:ext cx="2848314" cy="972544"/>
           </a:xfrm>
           <a:prstGeom prst="rect">
             <a:avLst/>
@@ -10188,12 +9981,14 @@
       </p:pic>
       <p:pic>
         <p:nvPicPr>
-          <p:cNvPr descr="preencoded.png" id="169" name="Google Shape;169;p9"/>
+          <p:cNvPr descr="preencoded.png" id="162" name="Google Shape;162;p9">
+            <a:hlinkClick r:id="rId15"/>
+          </p:cNvPr>
           <p:cNvPicPr preferRelativeResize="0"/>
           <p:nvPr/>
         </p:nvPicPr>
         <p:blipFill rotWithShape="1">
-          <a:blip r:embed="rId15">
+          <a:blip r:embed="rId16">
             <a:alphaModFix/>
           </a:blip>
           <a:srcRect b="0" l="0" r="0" t="0"/>
@@ -10201,8 +9996,8 @@
         </p:blipFill>
         <p:spPr>
           <a:xfrm>
-            <a:off x="1360" y="2202"/>
-            <a:ext cx="2848314" cy="972544"/>
+            <a:off x="13984282" y="9067338"/>
+            <a:ext cx="3505486" cy="820374"/>
           </a:xfrm>
           <a:prstGeom prst="rect">
             <a:avLst/>
@@ -10215,9 +10010,7 @@
       </p:pic>
       <p:pic>
         <p:nvPicPr>
-          <p:cNvPr descr="preencoded.png" id="170" name="Google Shape;170;p9">
-            <a:hlinkClick r:id="rId16"/>
-          </p:cNvPr>
+          <p:cNvPr descr="preencoded.png" id="163" name="Google Shape;163;p9"/>
           <p:cNvPicPr preferRelativeResize="0"/>
           <p:nvPr/>
         </p:nvPicPr>
@@ -10230,33 +10023,6 @@
         </p:blipFill>
         <p:spPr>
           <a:xfrm>
-            <a:off x="13984282" y="9067338"/>
-            <a:ext cx="3505486" cy="820374"/>
-          </a:xfrm>
-          <a:prstGeom prst="rect">
-            <a:avLst/>
-          </a:prstGeom>
-          <a:noFill/>
-          <a:ln>
-            <a:noFill/>
-          </a:ln>
-        </p:spPr>
-      </p:pic>
-      <p:pic>
-        <p:nvPicPr>
-          <p:cNvPr descr="preencoded.png" id="171" name="Google Shape;171;p9"/>
-          <p:cNvPicPr preferRelativeResize="0"/>
-          <p:nvPr/>
-        </p:nvPicPr>
-        <p:blipFill rotWithShape="1">
-          <a:blip r:embed="rId18">
-            <a:alphaModFix/>
-          </a:blip>
-          <a:srcRect b="0" l="0" r="0" t="0"/>
-          <a:stretch/>
-        </p:blipFill>
-        <p:spPr>
-          <a:xfrm>
             <a:off x="14335349" y="1285575"/>
             <a:ext cx="2848314" cy="972544"/>
           </a:xfrm>
@@ -10271,7 +10037,7 @@
       </p:pic>
       <p:sp>
         <p:nvSpPr>
-          <p:cNvPr id="172" name="Google Shape;172;p9"/>
+          <p:cNvPr id="164" name="Google Shape;164;p9"/>
           <p:cNvSpPr/>
           <p:nvPr/>
         </p:nvSpPr>
@@ -10337,7 +10103,7 @@
       </p:sp>
       <p:sp>
         <p:nvSpPr>
-          <p:cNvPr id="173" name="Google Shape;173;p9"/>
+          <p:cNvPr id="165" name="Google Shape;165;p9"/>
           <p:cNvSpPr/>
           <p:nvPr/>
         </p:nvSpPr>
@@ -10355,7 +10121,7 @@
           </a:ln>
         </p:spPr>
         <p:txBody>
-          <a:bodyPr anchorCtr="0" anchor="t" bIns="0" lIns="0" spcFirstLastPara="1" rIns="0" wrap="square" tIns="0">
+          <a:bodyPr anchorCtr="0" anchor="b" bIns="0" lIns="0" spcFirstLastPara="1" rIns="0" wrap="square" tIns="0">
             <a:noAutofit/>
           </a:bodyPr>
           <a:lstStyle/>
@@ -10403,14 +10169,14 @@
       </p:sp>
       <p:sp>
         <p:nvSpPr>
-          <p:cNvPr id="174" name="Google Shape;174;p9"/>
+          <p:cNvPr id="166" name="Google Shape;166;p9"/>
           <p:cNvSpPr/>
           <p:nvPr/>
         </p:nvSpPr>
         <p:spPr>
-          <a:xfrm rot="-600">
-            <a:off x="11383771" y="8001892"/>
-            <a:ext cx="1828893" cy="533709"/>
+          <a:xfrm rot="-564">
+            <a:off x="11040099" y="8001902"/>
+            <a:ext cx="1828800" cy="533700"/>
           </a:xfrm>
           <a:prstGeom prst="rect">
             <a:avLst/>

</xml_diff>